<commit_message>
heart disease prediction project
</commit_message>
<xml_diff>
--- a/Course_3_Classification/Classification_Project_Heart_Disease_Prediction.pptx
+++ b/Course_3_Classification/Classification_Project_Heart_Disease_Prediction.pptx
@@ -7,16 +7,24 @@
   <p:sldIdLst>
     <p:sldId id="256" r:id="rId2"/>
     <p:sldId id="261" r:id="rId3"/>
-    <p:sldId id="257" r:id="rId4"/>
-    <p:sldId id="258" r:id="rId5"/>
-    <p:sldId id="259" r:id="rId6"/>
-    <p:sldId id="262" r:id="rId7"/>
-    <p:sldId id="263" r:id="rId8"/>
-    <p:sldId id="260" r:id="rId9"/>
-    <p:sldId id="264" r:id="rId10"/>
-    <p:sldId id="267" r:id="rId11"/>
-    <p:sldId id="265" r:id="rId12"/>
-    <p:sldId id="266" r:id="rId13"/>
+    <p:sldId id="268" r:id="rId4"/>
+    <p:sldId id="257" r:id="rId5"/>
+    <p:sldId id="258" r:id="rId6"/>
+    <p:sldId id="259" r:id="rId7"/>
+    <p:sldId id="262" r:id="rId8"/>
+    <p:sldId id="263" r:id="rId9"/>
+    <p:sldId id="272" r:id="rId10"/>
+    <p:sldId id="260" r:id="rId11"/>
+    <p:sldId id="264" r:id="rId12"/>
+    <p:sldId id="274" r:id="rId13"/>
+    <p:sldId id="267" r:id="rId14"/>
+    <p:sldId id="265" r:id="rId15"/>
+    <p:sldId id="266" r:id="rId16"/>
+    <p:sldId id="269" r:id="rId17"/>
+    <p:sldId id="270" r:id="rId18"/>
+    <p:sldId id="273" r:id="rId19"/>
+    <p:sldId id="271" r:id="rId20"/>
+    <p:sldId id="275" r:id="rId21"/>
   </p:sldIdLst>
   <p:sldSz cx="12192000" cy="6858000"/>
   <p:notesSz cx="6858000" cy="9144000"/>
@@ -270,7 +278,7 @@
           <a:p>
             <a:fld id="{E76CB1F4-030E-4B9F-8297-51FB666C261C}" type="datetimeFigureOut">
               <a:rPr lang="en-US" smtClean="0"/>
-              <a:t>5/31/2022</a:t>
+              <a:t>6/5/2022</a:t>
             </a:fld>
             <a:endParaRPr lang="en-US"/>
           </a:p>
@@ -468,7 +476,7 @@
           <a:p>
             <a:fld id="{E76CB1F4-030E-4B9F-8297-51FB666C261C}" type="datetimeFigureOut">
               <a:rPr lang="en-US" smtClean="0"/>
-              <a:t>5/31/2022</a:t>
+              <a:t>6/5/2022</a:t>
             </a:fld>
             <a:endParaRPr lang="en-US"/>
           </a:p>
@@ -676,7 +684,7 @@
           <a:p>
             <a:fld id="{E76CB1F4-030E-4B9F-8297-51FB666C261C}" type="datetimeFigureOut">
               <a:rPr lang="en-US" smtClean="0"/>
-              <a:t>5/31/2022</a:t>
+              <a:t>6/5/2022</a:t>
             </a:fld>
             <a:endParaRPr lang="en-US"/>
           </a:p>
@@ -874,7 +882,7 @@
           <a:p>
             <a:fld id="{E76CB1F4-030E-4B9F-8297-51FB666C261C}" type="datetimeFigureOut">
               <a:rPr lang="en-US" smtClean="0"/>
-              <a:t>5/31/2022</a:t>
+              <a:t>6/5/2022</a:t>
             </a:fld>
             <a:endParaRPr lang="en-US"/>
           </a:p>
@@ -1149,7 +1157,7 @@
           <a:p>
             <a:fld id="{E76CB1F4-030E-4B9F-8297-51FB666C261C}" type="datetimeFigureOut">
               <a:rPr lang="en-US" smtClean="0"/>
-              <a:t>5/31/2022</a:t>
+              <a:t>6/5/2022</a:t>
             </a:fld>
             <a:endParaRPr lang="en-US"/>
           </a:p>
@@ -1414,7 +1422,7 @@
           <a:p>
             <a:fld id="{E76CB1F4-030E-4B9F-8297-51FB666C261C}" type="datetimeFigureOut">
               <a:rPr lang="en-US" smtClean="0"/>
-              <a:t>5/31/2022</a:t>
+              <a:t>6/5/2022</a:t>
             </a:fld>
             <a:endParaRPr lang="en-US"/>
           </a:p>
@@ -1826,7 +1834,7 @@
           <a:p>
             <a:fld id="{E76CB1F4-030E-4B9F-8297-51FB666C261C}" type="datetimeFigureOut">
               <a:rPr lang="en-US" smtClean="0"/>
-              <a:t>5/31/2022</a:t>
+              <a:t>6/5/2022</a:t>
             </a:fld>
             <a:endParaRPr lang="en-US"/>
           </a:p>
@@ -1967,7 +1975,7 @@
           <a:p>
             <a:fld id="{E76CB1F4-030E-4B9F-8297-51FB666C261C}" type="datetimeFigureOut">
               <a:rPr lang="en-US" smtClean="0"/>
-              <a:t>5/31/2022</a:t>
+              <a:t>6/5/2022</a:t>
             </a:fld>
             <a:endParaRPr lang="en-US"/>
           </a:p>
@@ -2080,7 +2088,7 @@
           <a:p>
             <a:fld id="{E76CB1F4-030E-4B9F-8297-51FB666C261C}" type="datetimeFigureOut">
               <a:rPr lang="en-US" smtClean="0"/>
-              <a:t>5/31/2022</a:t>
+              <a:t>6/5/2022</a:t>
             </a:fld>
             <a:endParaRPr lang="en-US"/>
           </a:p>
@@ -2391,7 +2399,7 @@
           <a:p>
             <a:fld id="{E76CB1F4-030E-4B9F-8297-51FB666C261C}" type="datetimeFigureOut">
               <a:rPr lang="en-US" smtClean="0"/>
-              <a:t>5/31/2022</a:t>
+              <a:t>6/5/2022</a:t>
             </a:fld>
             <a:endParaRPr lang="en-US"/>
           </a:p>
@@ -2679,7 +2687,7 @@
           <a:p>
             <a:fld id="{E76CB1F4-030E-4B9F-8297-51FB666C261C}" type="datetimeFigureOut">
               <a:rPr lang="en-US" smtClean="0"/>
-              <a:t>5/31/2022</a:t>
+              <a:t>6/5/2022</a:t>
             </a:fld>
             <a:endParaRPr lang="en-US"/>
           </a:p>
@@ -2920,7 +2928,7 @@
           <a:p>
             <a:fld id="{E76CB1F4-030E-4B9F-8297-51FB666C261C}" type="datetimeFigureOut">
               <a:rPr lang="en-US" smtClean="0"/>
-              <a:t>5/31/2022</a:t>
+              <a:t>6/5/2022</a:t>
             </a:fld>
             <a:endParaRPr lang="en-US"/>
           </a:p>
@@ -3358,7 +3366,10 @@
           <a:bodyPr/>
           <a:lstStyle/>
           <a:p>
-            <a:endParaRPr lang="en-US" dirty="0"/>
+            <a:r>
+              <a:rPr lang="en-US" dirty="0"/>
+              <a:t>Classification Project</a:t>
+            </a:r>
           </a:p>
         </p:txBody>
       </p:sp>
@@ -3378,12 +3389,20 @@
             <p:ph type="subTitle" idx="1"/>
           </p:nvPr>
         </p:nvSpPr>
-        <p:spPr/>
-        <p:txBody>
-          <a:bodyPr/>
-          <a:lstStyle/>
-          <a:p>
-            <a:endParaRPr lang="en-US"/>
+        <p:spPr>
+          <a:xfrm>
+            <a:off x="3223403" y="3509963"/>
+            <a:ext cx="9144000" cy="1655762"/>
+          </a:xfrm>
+        </p:spPr>
+        <p:txBody>
+          <a:bodyPr/>
+          <a:lstStyle/>
+          <a:p>
+            <a:r>
+              <a:rPr lang="en-US" dirty="0"/>
+              <a:t>M. Matrona</a:t>
+            </a:r>
           </a:p>
         </p:txBody>
       </p:sp>
@@ -3401,6 +3420,294 @@
 </file>
 
 <file path=ppt/slides/slide10.xml><?xml version="1.0" encoding="utf-8"?>
+<p:sld xmlns:a="http://schemas.openxmlformats.org/drawingml/2006/main" xmlns:r="http://schemas.openxmlformats.org/officeDocument/2006/relationships" xmlns:p="http://schemas.openxmlformats.org/presentationml/2006/main">
+  <p:cSld>
+    <p:spTree>
+      <p:nvGrpSpPr>
+        <p:cNvPr id="1" name=""/>
+        <p:cNvGrpSpPr/>
+        <p:nvPr/>
+      </p:nvGrpSpPr>
+      <p:grpSpPr>
+        <a:xfrm>
+          <a:off x="0" y="0"/>
+          <a:ext cx="0" cy="0"/>
+          <a:chOff x="0" y="0"/>
+          <a:chExt cx="0" cy="0"/>
+        </a:xfrm>
+      </p:grpSpPr>
+      <p:sp>
+        <p:nvSpPr>
+          <p:cNvPr id="2" name="Title 1">
+            <a:extLst>
+              <a:ext uri="{FF2B5EF4-FFF2-40B4-BE49-F238E27FC236}">
+                <a16:creationId xmlns:a16="http://schemas.microsoft.com/office/drawing/2014/main" id="{F4F3AF82-8EFE-C395-629C-39C789DA37A6}"/>
+              </a:ext>
+            </a:extLst>
+          </p:cNvPr>
+          <p:cNvSpPr>
+            <a:spLocks noGrp="1"/>
+          </p:cNvSpPr>
+          <p:nvPr>
+            <p:ph type="title"/>
+          </p:nvPr>
+        </p:nvSpPr>
+        <p:spPr/>
+        <p:txBody>
+          <a:bodyPr/>
+          <a:lstStyle/>
+          <a:p>
+            <a:r>
+              <a:rPr lang="en-US" dirty="0"/>
+              <a:t>Object of Analysis</a:t>
+            </a:r>
+          </a:p>
+        </p:txBody>
+      </p:sp>
+      <p:sp>
+        <p:nvSpPr>
+          <p:cNvPr id="3" name="Content Placeholder 2">
+            <a:extLst>
+              <a:ext uri="{FF2B5EF4-FFF2-40B4-BE49-F238E27FC236}">
+                <a16:creationId xmlns:a16="http://schemas.microsoft.com/office/drawing/2014/main" id="{3BEEFAA4-99A2-9810-5F01-EC6F653A109F}"/>
+              </a:ext>
+            </a:extLst>
+          </p:cNvPr>
+          <p:cNvSpPr>
+            <a:spLocks noGrp="1"/>
+          </p:cNvSpPr>
+          <p:nvPr>
+            <p:ph idx="1"/>
+          </p:nvPr>
+        </p:nvSpPr>
+        <p:spPr/>
+        <p:txBody>
+          <a:bodyPr/>
+          <a:lstStyle/>
+          <a:p>
+            <a:r>
+              <a:rPr lang="en-US" dirty="0"/>
+              <a:t>The objective of this analysis is to provide a model(s) to assist Doctors in diagnosing heart disease based on the features present.  </a:t>
+            </a:r>
+          </a:p>
+          <a:p>
+            <a:r>
+              <a:rPr lang="en-US" dirty="0"/>
+              <a:t>This will be attained by training 4 classification models and providing the model with the best performance to the “production team.”</a:t>
+            </a:r>
+          </a:p>
+          <a:p>
+            <a:r>
+              <a:rPr lang="en-US" dirty="0"/>
+              <a:t>Each model will have a varying degree of interpretability.  However, the final model selected will be the one which minimizes false negatives; without regard to interpretability.</a:t>
+            </a:r>
+          </a:p>
+          <a:p>
+            <a:pPr marL="0" indent="0">
+              <a:buNone/>
+            </a:pPr>
+            <a:endParaRPr lang="en-US" dirty="0"/>
+          </a:p>
+          <a:p>
+            <a:endParaRPr lang="en-US" dirty="0"/>
+          </a:p>
+        </p:txBody>
+      </p:sp>
+    </p:spTree>
+    <p:extLst>
+      <p:ext uri="{BB962C8B-B14F-4D97-AF65-F5344CB8AC3E}">
+        <p14:creationId xmlns:p14="http://schemas.microsoft.com/office/powerpoint/2010/main" val="145881549"/>
+      </p:ext>
+    </p:extLst>
+  </p:cSld>
+  <p:clrMapOvr>
+    <a:masterClrMapping/>
+  </p:clrMapOvr>
+</p:sld>
+</file>
+
+<file path=ppt/slides/slide11.xml><?xml version="1.0" encoding="utf-8"?>
+<p:sld xmlns:a="http://schemas.openxmlformats.org/drawingml/2006/main" xmlns:r="http://schemas.openxmlformats.org/officeDocument/2006/relationships" xmlns:p="http://schemas.openxmlformats.org/presentationml/2006/main">
+  <p:cSld>
+    <p:spTree>
+      <p:nvGrpSpPr>
+        <p:cNvPr id="1" name=""/>
+        <p:cNvGrpSpPr/>
+        <p:nvPr/>
+      </p:nvGrpSpPr>
+      <p:grpSpPr>
+        <a:xfrm>
+          <a:off x="0" y="0"/>
+          <a:ext cx="0" cy="0"/>
+          <a:chOff x="0" y="0"/>
+          <a:chExt cx="0" cy="0"/>
+        </a:xfrm>
+      </p:grpSpPr>
+      <p:sp>
+        <p:nvSpPr>
+          <p:cNvPr id="2" name="Title 1">
+            <a:extLst>
+              <a:ext uri="{FF2B5EF4-FFF2-40B4-BE49-F238E27FC236}">
+                <a16:creationId xmlns:a16="http://schemas.microsoft.com/office/drawing/2014/main" id="{80955CE2-94B4-5C73-241C-110298E67EAF}"/>
+              </a:ext>
+            </a:extLst>
+          </p:cNvPr>
+          <p:cNvSpPr>
+            <a:spLocks noGrp="1"/>
+          </p:cNvSpPr>
+          <p:nvPr>
+            <p:ph type="ctrTitle"/>
+          </p:nvPr>
+        </p:nvSpPr>
+        <p:spPr/>
+        <p:txBody>
+          <a:bodyPr/>
+          <a:lstStyle/>
+          <a:p>
+            <a:r>
+              <a:rPr lang="en-US" dirty="0"/>
+              <a:t>The Classifiers</a:t>
+            </a:r>
+          </a:p>
+        </p:txBody>
+      </p:sp>
+      <p:sp>
+        <p:nvSpPr>
+          <p:cNvPr id="3" name="Subtitle 2">
+            <a:extLst>
+              <a:ext uri="{FF2B5EF4-FFF2-40B4-BE49-F238E27FC236}">
+                <a16:creationId xmlns:a16="http://schemas.microsoft.com/office/drawing/2014/main" id="{A0C4E77C-BF71-6421-7EE3-37DDED0044B0}"/>
+              </a:ext>
+            </a:extLst>
+          </p:cNvPr>
+          <p:cNvSpPr>
+            <a:spLocks noGrp="1"/>
+          </p:cNvSpPr>
+          <p:nvPr>
+            <p:ph type="subTitle" idx="1"/>
+          </p:nvPr>
+        </p:nvSpPr>
+        <p:spPr/>
+        <p:txBody>
+          <a:bodyPr/>
+          <a:lstStyle/>
+          <a:p>
+            <a:endParaRPr lang="en-US"/>
+          </a:p>
+        </p:txBody>
+      </p:sp>
+    </p:spTree>
+    <p:extLst>
+      <p:ext uri="{BB962C8B-B14F-4D97-AF65-F5344CB8AC3E}">
+        <p14:creationId xmlns:p14="http://schemas.microsoft.com/office/powerpoint/2010/main" val="3680377310"/>
+      </p:ext>
+    </p:extLst>
+  </p:cSld>
+  <p:clrMapOvr>
+    <a:masterClrMapping/>
+  </p:clrMapOvr>
+</p:sld>
+</file>
+
+<file path=ppt/slides/slide12.xml><?xml version="1.0" encoding="utf-8"?>
+<p:sld xmlns:a="http://schemas.openxmlformats.org/drawingml/2006/main" xmlns:r="http://schemas.openxmlformats.org/officeDocument/2006/relationships" xmlns:p="http://schemas.openxmlformats.org/presentationml/2006/main">
+  <p:cSld>
+    <p:spTree>
+      <p:nvGrpSpPr>
+        <p:cNvPr id="1" name=""/>
+        <p:cNvGrpSpPr/>
+        <p:nvPr/>
+      </p:nvGrpSpPr>
+      <p:grpSpPr>
+        <a:xfrm>
+          <a:off x="0" y="0"/>
+          <a:ext cx="0" cy="0"/>
+          <a:chOff x="0" y="0"/>
+          <a:chExt cx="0" cy="0"/>
+        </a:xfrm>
+      </p:grpSpPr>
+      <p:sp>
+        <p:nvSpPr>
+          <p:cNvPr id="2" name="Title 1">
+            <a:extLst>
+              <a:ext uri="{FF2B5EF4-FFF2-40B4-BE49-F238E27FC236}">
+                <a16:creationId xmlns:a16="http://schemas.microsoft.com/office/drawing/2014/main" id="{4BB662B0-1B87-71A4-C85F-766E73AC1087}"/>
+              </a:ext>
+            </a:extLst>
+          </p:cNvPr>
+          <p:cNvSpPr>
+            <a:spLocks noGrp="1"/>
+          </p:cNvSpPr>
+          <p:nvPr>
+            <p:ph type="title"/>
+          </p:nvPr>
+        </p:nvSpPr>
+        <p:spPr/>
+        <p:txBody>
+          <a:bodyPr/>
+          <a:lstStyle/>
+          <a:p>
+            <a:r>
+              <a:rPr lang="en-US" dirty="0"/>
+              <a:t>Model Training Details</a:t>
+            </a:r>
+          </a:p>
+        </p:txBody>
+      </p:sp>
+      <p:sp>
+        <p:nvSpPr>
+          <p:cNvPr id="3" name="Content Placeholder 2">
+            <a:extLst>
+              <a:ext uri="{FF2B5EF4-FFF2-40B4-BE49-F238E27FC236}">
+                <a16:creationId xmlns:a16="http://schemas.microsoft.com/office/drawing/2014/main" id="{C6745355-7128-0D23-91F6-B5B59234223D}"/>
+              </a:ext>
+            </a:extLst>
+          </p:cNvPr>
+          <p:cNvSpPr>
+            <a:spLocks noGrp="1"/>
+          </p:cNvSpPr>
+          <p:nvPr>
+            <p:ph idx="1"/>
+          </p:nvPr>
+        </p:nvSpPr>
+        <p:spPr/>
+        <p:txBody>
+          <a:bodyPr/>
+          <a:lstStyle/>
+          <a:p>
+            <a:r>
+              <a:rPr lang="en-US" dirty="0"/>
+              <a:t>All models were trained using 5-fold cross validation of the training data.</a:t>
+            </a:r>
+          </a:p>
+          <a:p>
+            <a:r>
+              <a:rPr lang="en-US" dirty="0"/>
+              <a:t>A holdout set was taken so that models could be tested on data that was not used in any training capacity.</a:t>
+            </a:r>
+          </a:p>
+          <a:p>
+            <a:endParaRPr lang="en-US" dirty="0"/>
+          </a:p>
+          <a:p>
+            <a:endParaRPr lang="en-US" dirty="0"/>
+          </a:p>
+        </p:txBody>
+      </p:sp>
+    </p:spTree>
+    <p:extLst>
+      <p:ext uri="{BB962C8B-B14F-4D97-AF65-F5344CB8AC3E}">
+        <p14:creationId xmlns:p14="http://schemas.microsoft.com/office/powerpoint/2010/main" val="175297085"/>
+      </p:ext>
+    </p:extLst>
+  </p:cSld>
+  <p:clrMapOvr>
+    <a:masterClrMapping/>
+  </p:clrMapOvr>
+</p:sld>
+</file>
+
+<file path=ppt/slides/slide13.xml><?xml version="1.0" encoding="utf-8"?>
 <p:sld xmlns:a="http://schemas.openxmlformats.org/drawingml/2006/main" xmlns:r="http://schemas.openxmlformats.org/officeDocument/2006/relationships" xmlns:p="http://schemas.openxmlformats.org/presentationml/2006/main">
   <p:cSld>
     <p:spTree>
@@ -3576,7 +3883,7 @@
 </p:sld>
 </file>
 
-<file path=ppt/slides/slide11.xml><?xml version="1.0" encoding="utf-8"?>
+<file path=ppt/slides/slide14.xml><?xml version="1.0" encoding="utf-8"?>
 <p:sld xmlns:a="http://schemas.openxmlformats.org/drawingml/2006/main" xmlns:r="http://schemas.openxmlformats.org/officeDocument/2006/relationships" xmlns:p="http://schemas.openxmlformats.org/presentationml/2006/main">
   <p:cSld>
     <p:spTree>
@@ -3681,7 +3988,7 @@
 </p:sld>
 </file>
 
-<file path=ppt/slides/slide12.xml><?xml version="1.0" encoding="utf-8"?>
+<file path=ppt/slides/slide15.xml><?xml version="1.0" encoding="utf-8"?>
 <p:sld xmlns:a="http://schemas.openxmlformats.org/drawingml/2006/main" xmlns:r="http://schemas.openxmlformats.org/officeDocument/2006/relationships" xmlns:p="http://schemas.openxmlformats.org/presentationml/2006/main">
   <p:cSld>
     <p:spTree>
@@ -3749,7 +4056,14 @@
           <a:p>
             <a:r>
               <a:rPr lang="en-US" dirty="0"/>
-              <a:t>The confusion matrix for the best performing model is given here.  Recall was the scoring method that was best able to minimize false negatives.</a:t>
+              <a:t>The confusion matrix for the best performing model is given here. </a:t>
+            </a:r>
+          </a:p>
+          <a:p>
+            <a:pPr lvl="1"/>
+            <a:r>
+              <a:rPr lang="en-US" dirty="0"/>
+              <a:t> Recall was the scoring method that was best able to minimize false negatives.</a:t>
             </a:r>
           </a:p>
           <a:p>
@@ -3757,6 +4071,12 @@
               <a:rPr lang="en-US" dirty="0"/>
               <a:t>The optimized hyperparameters are: </a:t>
             </a:r>
+          </a:p>
+          <a:p>
+            <a:pPr marL="0" indent="0">
+              <a:buNone/>
+            </a:pPr>
+            <a:endParaRPr lang="en-US" dirty="0"/>
           </a:p>
           <a:p>
             <a:endParaRPr lang="en-US" dirty="0"/>
@@ -3812,8 +4132,8 @@
         </p:nvSpPr>
         <p:spPr bwMode="auto">
           <a:xfrm>
-            <a:off x="6970143" y="3275112"/>
-            <a:ext cx="3850257" cy="153888"/>
+            <a:off x="6556075" y="2881706"/>
+            <a:ext cx="5047891" cy="153888"/>
           </a:xfrm>
           <a:prstGeom prst="rect">
             <a:avLst/>
@@ -3979,6 +4299,677 @@
 </p:sld>
 </file>
 
+<file path=ppt/slides/slide16.xml><?xml version="1.0" encoding="utf-8"?>
+<p:sld xmlns:a="http://schemas.openxmlformats.org/drawingml/2006/main" xmlns:r="http://schemas.openxmlformats.org/officeDocument/2006/relationships" xmlns:p="http://schemas.openxmlformats.org/presentationml/2006/main">
+  <p:cSld>
+    <p:spTree>
+      <p:nvGrpSpPr>
+        <p:cNvPr id="1" name=""/>
+        <p:cNvGrpSpPr/>
+        <p:nvPr/>
+      </p:nvGrpSpPr>
+      <p:grpSpPr>
+        <a:xfrm>
+          <a:off x="0" y="0"/>
+          <a:ext cx="0" cy="0"/>
+          <a:chOff x="0" y="0"/>
+          <a:chExt cx="0" cy="0"/>
+        </a:xfrm>
+      </p:grpSpPr>
+      <p:sp>
+        <p:nvSpPr>
+          <p:cNvPr id="2" name="Title 1">
+            <a:extLst>
+              <a:ext uri="{FF2B5EF4-FFF2-40B4-BE49-F238E27FC236}">
+                <a16:creationId xmlns:a16="http://schemas.microsoft.com/office/drawing/2014/main" id="{7FA710CA-2125-165A-E52C-602756312DFF}"/>
+              </a:ext>
+            </a:extLst>
+          </p:cNvPr>
+          <p:cNvSpPr>
+            <a:spLocks noGrp="1"/>
+          </p:cNvSpPr>
+          <p:nvPr>
+            <p:ph type="title"/>
+          </p:nvPr>
+        </p:nvSpPr>
+        <p:spPr/>
+        <p:txBody>
+          <a:bodyPr/>
+          <a:lstStyle/>
+          <a:p>
+            <a:r>
+              <a:rPr lang="en-US" dirty="0"/>
+              <a:t>Decision Tree</a:t>
+            </a:r>
+          </a:p>
+        </p:txBody>
+      </p:sp>
+      <p:sp>
+        <p:nvSpPr>
+          <p:cNvPr id="3" name="Content Placeholder 2">
+            <a:extLst>
+              <a:ext uri="{FF2B5EF4-FFF2-40B4-BE49-F238E27FC236}">
+                <a16:creationId xmlns:a16="http://schemas.microsoft.com/office/drawing/2014/main" id="{3E25166F-E124-22D2-6595-1ABA7E602BE1}"/>
+              </a:ext>
+            </a:extLst>
+          </p:cNvPr>
+          <p:cNvSpPr>
+            <a:spLocks noGrp="1"/>
+          </p:cNvSpPr>
+          <p:nvPr>
+            <p:ph idx="1"/>
+          </p:nvPr>
+        </p:nvSpPr>
+        <p:spPr/>
+        <p:txBody>
+          <a:bodyPr/>
+          <a:lstStyle/>
+          <a:p>
+            <a:r>
+              <a:rPr lang="en-US" dirty="0"/>
+              <a:t>Two decision trees were fit to the training. </a:t>
+            </a:r>
+          </a:p>
+          <a:p>
+            <a:pPr marL="914400" lvl="1" indent="-457200">
+              <a:buFont typeface="+mj-lt"/>
+              <a:buAutoNum type="arabicPeriod"/>
+            </a:pPr>
+            <a:r>
+              <a:rPr lang="en-US" dirty="0"/>
+              <a:t>A tree with the maximum amount of overfitting (nodes/feature </a:t>
+            </a:r>
+            <a:r>
+              <a:rPr lang="en-US" dirty="0" err="1"/>
+              <a:t>importances</a:t>
+            </a:r>
+            <a:r>
+              <a:rPr lang="en-US" dirty="0"/>
+              <a:t>)</a:t>
+            </a:r>
+          </a:p>
+          <a:p>
+            <a:pPr marL="914400" lvl="1" indent="-457200">
+              <a:buFont typeface="+mj-lt"/>
+              <a:buAutoNum type="arabicPeriod"/>
+            </a:pPr>
+            <a:r>
+              <a:rPr lang="en-US" dirty="0"/>
+              <a:t>A pruned tree which checked the recall metric at a variety of node counts and features </a:t>
+            </a:r>
+            <a:r>
+              <a:rPr lang="en-US" dirty="0" err="1"/>
+              <a:t>importances</a:t>
+            </a:r>
+            <a:r>
+              <a:rPr lang="en-US" dirty="0"/>
+              <a:t>. </a:t>
+            </a:r>
+          </a:p>
+          <a:p>
+            <a:r>
+              <a:rPr lang="en-US" dirty="0"/>
+              <a:t>The top performing pruned tree had 15 nodes and 3 feature </a:t>
+            </a:r>
+            <a:r>
+              <a:rPr lang="en-US" dirty="0" err="1"/>
+              <a:t>importances</a:t>
+            </a:r>
+            <a:r>
+              <a:rPr lang="en-US" dirty="0"/>
+              <a:t>.</a:t>
+            </a:r>
+          </a:p>
+        </p:txBody>
+      </p:sp>
+    </p:spTree>
+    <p:extLst>
+      <p:ext uri="{BB962C8B-B14F-4D97-AF65-F5344CB8AC3E}">
+        <p14:creationId xmlns:p14="http://schemas.microsoft.com/office/powerpoint/2010/main" val="42969533"/>
+      </p:ext>
+    </p:extLst>
+  </p:cSld>
+  <p:clrMapOvr>
+    <a:masterClrMapping/>
+  </p:clrMapOvr>
+</p:sld>
+</file>
+
+<file path=ppt/slides/slide17.xml><?xml version="1.0" encoding="utf-8"?>
+<p:sld xmlns:a="http://schemas.openxmlformats.org/drawingml/2006/main" xmlns:r="http://schemas.openxmlformats.org/officeDocument/2006/relationships" xmlns:p="http://schemas.openxmlformats.org/presentationml/2006/main">
+  <p:cSld>
+    <p:spTree>
+      <p:nvGrpSpPr>
+        <p:cNvPr id="1" name=""/>
+        <p:cNvGrpSpPr/>
+        <p:nvPr/>
+      </p:nvGrpSpPr>
+      <p:grpSpPr>
+        <a:xfrm>
+          <a:off x="0" y="0"/>
+          <a:ext cx="0" cy="0"/>
+          <a:chOff x="0" y="0"/>
+          <a:chExt cx="0" cy="0"/>
+        </a:xfrm>
+      </p:grpSpPr>
+      <p:sp>
+        <p:nvSpPr>
+          <p:cNvPr id="2" name="Title 1">
+            <a:extLst>
+              <a:ext uri="{FF2B5EF4-FFF2-40B4-BE49-F238E27FC236}">
+                <a16:creationId xmlns:a16="http://schemas.microsoft.com/office/drawing/2014/main" id="{A90E9113-DD43-75F8-3EB2-D4B631E4B477}"/>
+              </a:ext>
+            </a:extLst>
+          </p:cNvPr>
+          <p:cNvSpPr>
+            <a:spLocks noGrp="1"/>
+          </p:cNvSpPr>
+          <p:nvPr>
+            <p:ph type="title"/>
+          </p:nvPr>
+        </p:nvSpPr>
+        <p:spPr/>
+        <p:txBody>
+          <a:bodyPr/>
+          <a:lstStyle/>
+          <a:p>
+            <a:r>
+              <a:rPr lang="en-US" dirty="0"/>
+              <a:t>Decision Tree – Best Pruned Model</a:t>
+            </a:r>
+          </a:p>
+        </p:txBody>
+      </p:sp>
+      <p:pic>
+        <p:nvPicPr>
+          <p:cNvPr id="1026" name="Picture 2">
+            <a:extLst>
+              <a:ext uri="{FF2B5EF4-FFF2-40B4-BE49-F238E27FC236}">
+                <a16:creationId xmlns:a16="http://schemas.microsoft.com/office/drawing/2014/main" id="{B028E437-768B-6CA6-0F6B-E7EBC2882A86}"/>
+              </a:ext>
+            </a:extLst>
+          </p:cNvPr>
+          <p:cNvPicPr>
+            <a:picLocks noGrp="1" noChangeAspect="1" noChangeArrowheads="1"/>
+          </p:cNvPicPr>
+          <p:nvPr>
+            <p:ph idx="1"/>
+          </p:nvPr>
+        </p:nvPicPr>
+        <p:blipFill>
+          <a:blip r:embed="rId2">
+            <a:extLst>
+              <a:ext uri="{28A0092B-C50C-407E-A947-70E740481C1C}">
+                <a14:useLocalDpi xmlns:a14="http://schemas.microsoft.com/office/drawing/2010/main" val="0"/>
+              </a:ext>
+            </a:extLst>
+          </a:blip>
+          <a:srcRect/>
+          <a:stretch>
+            <a:fillRect/>
+          </a:stretch>
+        </p:blipFill>
+        <p:spPr bwMode="auto">
+          <a:xfrm>
+            <a:off x="838200" y="1954993"/>
+            <a:ext cx="10515600" cy="4092602"/>
+          </a:xfrm>
+          <a:prstGeom prst="rect">
+            <a:avLst/>
+          </a:prstGeom>
+          <a:noFill/>
+          <a:extLst>
+            <a:ext uri="{909E8E84-426E-40DD-AFC4-6F175D3DCCD1}">
+              <a14:hiddenFill xmlns:a14="http://schemas.microsoft.com/office/drawing/2010/main">
+                <a:solidFill>
+                  <a:srgbClr val="FFFFFF"/>
+                </a:solidFill>
+              </a14:hiddenFill>
+            </a:ext>
+          </a:extLst>
+        </p:spPr>
+      </p:pic>
+      <p:pic>
+        <p:nvPicPr>
+          <p:cNvPr id="5" name="Content Placeholder 4">
+            <a:extLst>
+              <a:ext uri="{FF2B5EF4-FFF2-40B4-BE49-F238E27FC236}">
+                <a16:creationId xmlns:a16="http://schemas.microsoft.com/office/drawing/2014/main" id="{BB9E2C89-075B-536E-4435-354CEC8DCEAA}"/>
+              </a:ext>
+            </a:extLst>
+          </p:cNvPr>
+          <p:cNvPicPr>
+            <a:picLocks noChangeAspect="1"/>
+          </p:cNvPicPr>
+          <p:nvPr/>
+        </p:nvPicPr>
+        <p:blipFill>
+          <a:blip r:embed="rId3"/>
+          <a:stretch>
+            <a:fillRect/>
+          </a:stretch>
+        </p:blipFill>
+        <p:spPr>
+          <a:xfrm>
+            <a:off x="9145530" y="1690688"/>
+            <a:ext cx="2208270" cy="1392716"/>
+          </a:xfrm>
+          <a:prstGeom prst="rect">
+            <a:avLst/>
+          </a:prstGeom>
+        </p:spPr>
+      </p:pic>
+    </p:spTree>
+    <p:extLst>
+      <p:ext uri="{BB962C8B-B14F-4D97-AF65-F5344CB8AC3E}">
+        <p14:creationId xmlns:p14="http://schemas.microsoft.com/office/powerpoint/2010/main" val="1497520195"/>
+      </p:ext>
+    </p:extLst>
+  </p:cSld>
+  <p:clrMapOvr>
+    <a:masterClrMapping/>
+  </p:clrMapOvr>
+</p:sld>
+</file>
+
+<file path=ppt/slides/slide18.xml><?xml version="1.0" encoding="utf-8"?>
+<p:sld xmlns:a="http://schemas.openxmlformats.org/drawingml/2006/main" xmlns:r="http://schemas.openxmlformats.org/officeDocument/2006/relationships" xmlns:p="http://schemas.openxmlformats.org/presentationml/2006/main">
+  <p:cSld>
+    <p:spTree>
+      <p:nvGrpSpPr>
+        <p:cNvPr id="1" name=""/>
+        <p:cNvGrpSpPr/>
+        <p:nvPr/>
+      </p:nvGrpSpPr>
+      <p:grpSpPr>
+        <a:xfrm>
+          <a:off x="0" y="0"/>
+          <a:ext cx="0" cy="0"/>
+          <a:chOff x="0" y="0"/>
+          <a:chExt cx="0" cy="0"/>
+        </a:xfrm>
+      </p:grpSpPr>
+      <p:sp>
+        <p:nvSpPr>
+          <p:cNvPr id="2" name="Title 1">
+            <a:extLst>
+              <a:ext uri="{FF2B5EF4-FFF2-40B4-BE49-F238E27FC236}">
+                <a16:creationId xmlns:a16="http://schemas.microsoft.com/office/drawing/2014/main" id="{C3EBB70C-ECC6-712E-7844-0D77D1B7284E}"/>
+              </a:ext>
+            </a:extLst>
+          </p:cNvPr>
+          <p:cNvSpPr>
+            <a:spLocks noGrp="1"/>
+          </p:cNvSpPr>
+          <p:nvPr>
+            <p:ph type="title"/>
+          </p:nvPr>
+        </p:nvSpPr>
+        <p:spPr/>
+        <p:txBody>
+          <a:bodyPr/>
+          <a:lstStyle/>
+          <a:p>
+            <a:r>
+              <a:rPr lang="en-US" dirty="0"/>
+              <a:t>Decision Tree – Confusion Matrix</a:t>
+            </a:r>
+          </a:p>
+        </p:txBody>
+      </p:sp>
+      <p:pic>
+        <p:nvPicPr>
+          <p:cNvPr id="2050" name="Picture 2">
+            <a:extLst>
+              <a:ext uri="{FF2B5EF4-FFF2-40B4-BE49-F238E27FC236}">
+                <a16:creationId xmlns:a16="http://schemas.microsoft.com/office/drawing/2014/main" id="{691D7643-EFDC-B2DE-1945-3F81CDE900ED}"/>
+              </a:ext>
+            </a:extLst>
+          </p:cNvPr>
+          <p:cNvPicPr>
+            <a:picLocks noGrp="1" noChangeAspect="1" noChangeArrowheads="1"/>
+          </p:cNvPicPr>
+          <p:nvPr>
+            <p:ph idx="1"/>
+          </p:nvPr>
+        </p:nvPicPr>
+        <p:blipFill>
+          <a:blip r:embed="rId2">
+            <a:extLst>
+              <a:ext uri="{28A0092B-C50C-407E-A947-70E740481C1C}">
+                <a14:useLocalDpi xmlns:a14="http://schemas.microsoft.com/office/drawing/2010/main" val="0"/>
+              </a:ext>
+            </a:extLst>
+          </a:blip>
+          <a:srcRect/>
+          <a:stretch>
+            <a:fillRect/>
+          </a:stretch>
+        </p:blipFill>
+        <p:spPr bwMode="auto">
+          <a:xfrm>
+            <a:off x="2909066" y="2984916"/>
+            <a:ext cx="4596825" cy="3326984"/>
+          </a:xfrm>
+          <a:prstGeom prst="rect">
+            <a:avLst/>
+          </a:prstGeom>
+          <a:noFill/>
+          <a:extLst>
+            <a:ext uri="{909E8E84-426E-40DD-AFC4-6F175D3DCCD1}">
+              <a14:hiddenFill xmlns:a14="http://schemas.microsoft.com/office/drawing/2010/main">
+                <a:solidFill>
+                  <a:srgbClr val="FFFFFF"/>
+                </a:solidFill>
+              </a14:hiddenFill>
+            </a:ext>
+          </a:extLst>
+        </p:spPr>
+      </p:pic>
+      <p:sp>
+        <p:nvSpPr>
+          <p:cNvPr id="5" name="Content Placeholder 2">
+            <a:extLst>
+              <a:ext uri="{FF2B5EF4-FFF2-40B4-BE49-F238E27FC236}">
+                <a16:creationId xmlns:a16="http://schemas.microsoft.com/office/drawing/2014/main" id="{3F1C2D28-D492-3BAF-1DD9-6902D44C4BFE}"/>
+              </a:ext>
+            </a:extLst>
+          </p:cNvPr>
+          <p:cNvSpPr txBox="1">
+            <a:spLocks/>
+          </p:cNvSpPr>
+          <p:nvPr/>
+        </p:nvSpPr>
+        <p:spPr>
+          <a:xfrm>
+            <a:off x="838200" y="1825625"/>
+            <a:ext cx="10515600" cy="4351338"/>
+          </a:xfrm>
+          <a:prstGeom prst="rect">
+            <a:avLst/>
+          </a:prstGeom>
+        </p:spPr>
+        <p:txBody>
+          <a:bodyPr vert="horz" lIns="91440" tIns="45720" rIns="91440" bIns="45720" rtlCol="0">
+            <a:normAutofit/>
+          </a:bodyPr>
+          <a:lstStyle>
+            <a:lvl1pPr marL="228600" indent="-228600" algn="l" defTabSz="914400" rtl="0" eaLnBrk="1" latinLnBrk="0" hangingPunct="1">
+              <a:lnSpc>
+                <a:spcPct val="90000"/>
+              </a:lnSpc>
+              <a:spcBef>
+                <a:spcPts val="1000"/>
+              </a:spcBef>
+              <a:buFont typeface="Arial" panose="020B0604020202020204" pitchFamily="34" charset="0"/>
+              <a:buChar char="•"/>
+              <a:defRPr sz="2800" kern="1200">
+                <a:solidFill>
+                  <a:schemeClr val="tx1"/>
+                </a:solidFill>
+                <a:latin typeface="+mn-lt"/>
+                <a:ea typeface="+mn-ea"/>
+                <a:cs typeface="+mn-cs"/>
+              </a:defRPr>
+            </a:lvl1pPr>
+            <a:lvl2pPr marL="685800" indent="-228600" algn="l" defTabSz="914400" rtl="0" eaLnBrk="1" latinLnBrk="0" hangingPunct="1">
+              <a:lnSpc>
+                <a:spcPct val="90000"/>
+              </a:lnSpc>
+              <a:spcBef>
+                <a:spcPts val="500"/>
+              </a:spcBef>
+              <a:buFont typeface="Arial" panose="020B0604020202020204" pitchFamily="34" charset="0"/>
+              <a:buChar char="•"/>
+              <a:defRPr sz="2400" kern="1200">
+                <a:solidFill>
+                  <a:schemeClr val="tx1"/>
+                </a:solidFill>
+                <a:latin typeface="+mn-lt"/>
+                <a:ea typeface="+mn-ea"/>
+                <a:cs typeface="+mn-cs"/>
+              </a:defRPr>
+            </a:lvl2pPr>
+            <a:lvl3pPr marL="1143000" indent="-228600" algn="l" defTabSz="914400" rtl="0" eaLnBrk="1" latinLnBrk="0" hangingPunct="1">
+              <a:lnSpc>
+                <a:spcPct val="90000"/>
+              </a:lnSpc>
+              <a:spcBef>
+                <a:spcPts val="500"/>
+              </a:spcBef>
+              <a:buFont typeface="Arial" panose="020B0604020202020204" pitchFamily="34" charset="0"/>
+              <a:buChar char="•"/>
+              <a:defRPr sz="2000" kern="1200">
+                <a:solidFill>
+                  <a:schemeClr val="tx1"/>
+                </a:solidFill>
+                <a:latin typeface="+mn-lt"/>
+                <a:ea typeface="+mn-ea"/>
+                <a:cs typeface="+mn-cs"/>
+              </a:defRPr>
+            </a:lvl3pPr>
+            <a:lvl4pPr marL="1600200" indent="-228600" algn="l" defTabSz="914400" rtl="0" eaLnBrk="1" latinLnBrk="0" hangingPunct="1">
+              <a:lnSpc>
+                <a:spcPct val="90000"/>
+              </a:lnSpc>
+              <a:spcBef>
+                <a:spcPts val="500"/>
+              </a:spcBef>
+              <a:buFont typeface="Arial" panose="020B0604020202020204" pitchFamily="34" charset="0"/>
+              <a:buChar char="•"/>
+              <a:defRPr sz="1800" kern="1200">
+                <a:solidFill>
+                  <a:schemeClr val="tx1"/>
+                </a:solidFill>
+                <a:latin typeface="+mn-lt"/>
+                <a:ea typeface="+mn-ea"/>
+                <a:cs typeface="+mn-cs"/>
+              </a:defRPr>
+            </a:lvl4pPr>
+            <a:lvl5pPr marL="2057400" indent="-228600" algn="l" defTabSz="914400" rtl="0" eaLnBrk="1" latinLnBrk="0" hangingPunct="1">
+              <a:lnSpc>
+                <a:spcPct val="90000"/>
+              </a:lnSpc>
+              <a:spcBef>
+                <a:spcPts val="500"/>
+              </a:spcBef>
+              <a:buFont typeface="Arial" panose="020B0604020202020204" pitchFamily="34" charset="0"/>
+              <a:buChar char="•"/>
+              <a:defRPr sz="1800" kern="1200">
+                <a:solidFill>
+                  <a:schemeClr val="tx1"/>
+                </a:solidFill>
+                <a:latin typeface="+mn-lt"/>
+                <a:ea typeface="+mn-ea"/>
+                <a:cs typeface="+mn-cs"/>
+              </a:defRPr>
+            </a:lvl5pPr>
+            <a:lvl6pPr marL="2514600" indent="-228600" algn="l" defTabSz="914400" rtl="0" eaLnBrk="1" latinLnBrk="0" hangingPunct="1">
+              <a:lnSpc>
+                <a:spcPct val="90000"/>
+              </a:lnSpc>
+              <a:spcBef>
+                <a:spcPts val="500"/>
+              </a:spcBef>
+              <a:buFont typeface="Arial" panose="020B0604020202020204" pitchFamily="34" charset="0"/>
+              <a:buChar char="•"/>
+              <a:defRPr sz="1800" kern="1200">
+                <a:solidFill>
+                  <a:schemeClr val="tx1"/>
+                </a:solidFill>
+                <a:latin typeface="+mn-lt"/>
+                <a:ea typeface="+mn-ea"/>
+                <a:cs typeface="+mn-cs"/>
+              </a:defRPr>
+            </a:lvl6pPr>
+            <a:lvl7pPr marL="2971800" indent="-228600" algn="l" defTabSz="914400" rtl="0" eaLnBrk="1" latinLnBrk="0" hangingPunct="1">
+              <a:lnSpc>
+                <a:spcPct val="90000"/>
+              </a:lnSpc>
+              <a:spcBef>
+                <a:spcPts val="500"/>
+              </a:spcBef>
+              <a:buFont typeface="Arial" panose="020B0604020202020204" pitchFamily="34" charset="0"/>
+              <a:buChar char="•"/>
+              <a:defRPr sz="1800" kern="1200">
+                <a:solidFill>
+                  <a:schemeClr val="tx1"/>
+                </a:solidFill>
+                <a:latin typeface="+mn-lt"/>
+                <a:ea typeface="+mn-ea"/>
+                <a:cs typeface="+mn-cs"/>
+              </a:defRPr>
+            </a:lvl7pPr>
+            <a:lvl8pPr marL="3429000" indent="-228600" algn="l" defTabSz="914400" rtl="0" eaLnBrk="1" latinLnBrk="0" hangingPunct="1">
+              <a:lnSpc>
+                <a:spcPct val="90000"/>
+              </a:lnSpc>
+              <a:spcBef>
+                <a:spcPts val="500"/>
+              </a:spcBef>
+              <a:buFont typeface="Arial" panose="020B0604020202020204" pitchFamily="34" charset="0"/>
+              <a:buChar char="•"/>
+              <a:defRPr sz="1800" kern="1200">
+                <a:solidFill>
+                  <a:schemeClr val="tx1"/>
+                </a:solidFill>
+                <a:latin typeface="+mn-lt"/>
+                <a:ea typeface="+mn-ea"/>
+                <a:cs typeface="+mn-cs"/>
+              </a:defRPr>
+            </a:lvl8pPr>
+            <a:lvl9pPr marL="3886200" indent="-228600" algn="l" defTabSz="914400" rtl="0" eaLnBrk="1" latinLnBrk="0" hangingPunct="1">
+              <a:lnSpc>
+                <a:spcPct val="90000"/>
+              </a:lnSpc>
+              <a:spcBef>
+                <a:spcPts val="500"/>
+              </a:spcBef>
+              <a:buFont typeface="Arial" panose="020B0604020202020204" pitchFamily="34" charset="0"/>
+              <a:buChar char="•"/>
+              <a:defRPr sz="1800" kern="1200">
+                <a:solidFill>
+                  <a:schemeClr val="tx1"/>
+                </a:solidFill>
+                <a:latin typeface="+mn-lt"/>
+                <a:ea typeface="+mn-ea"/>
+                <a:cs typeface="+mn-cs"/>
+              </a:defRPr>
+            </a:lvl9pPr>
+          </a:lstStyle>
+          <a:p>
+            <a:r>
+              <a:rPr lang="en-US" dirty="0"/>
+              <a:t>The optimized tree performed dramatically worse than the logistic regression models and the SVC.</a:t>
+            </a:r>
+          </a:p>
+        </p:txBody>
+      </p:sp>
+    </p:spTree>
+    <p:extLst>
+      <p:ext uri="{BB962C8B-B14F-4D97-AF65-F5344CB8AC3E}">
+        <p14:creationId xmlns:p14="http://schemas.microsoft.com/office/powerpoint/2010/main" val="3310211192"/>
+      </p:ext>
+    </p:extLst>
+  </p:cSld>
+  <p:clrMapOvr>
+    <a:masterClrMapping/>
+  </p:clrMapOvr>
+</p:sld>
+</file>
+
+<file path=ppt/slides/slide19.xml><?xml version="1.0" encoding="utf-8"?>
+<p:sld xmlns:a="http://schemas.openxmlformats.org/drawingml/2006/main" xmlns:r="http://schemas.openxmlformats.org/officeDocument/2006/relationships" xmlns:p="http://schemas.openxmlformats.org/presentationml/2006/main">
+  <p:cSld>
+    <p:spTree>
+      <p:nvGrpSpPr>
+        <p:cNvPr id="1" name=""/>
+        <p:cNvGrpSpPr/>
+        <p:nvPr/>
+      </p:nvGrpSpPr>
+      <p:grpSpPr>
+        <a:xfrm>
+          <a:off x="0" y="0"/>
+          <a:ext cx="0" cy="0"/>
+          <a:chOff x="0" y="0"/>
+          <a:chExt cx="0" cy="0"/>
+        </a:xfrm>
+      </p:grpSpPr>
+      <p:sp>
+        <p:nvSpPr>
+          <p:cNvPr id="2" name="Title 1">
+            <a:extLst>
+              <a:ext uri="{FF2B5EF4-FFF2-40B4-BE49-F238E27FC236}">
+                <a16:creationId xmlns:a16="http://schemas.microsoft.com/office/drawing/2014/main" id="{CCA20010-23F4-C428-2C73-DFA1B6738090}"/>
+              </a:ext>
+            </a:extLst>
+          </p:cNvPr>
+          <p:cNvSpPr>
+            <a:spLocks noGrp="1"/>
+          </p:cNvSpPr>
+          <p:nvPr>
+            <p:ph type="title"/>
+          </p:nvPr>
+        </p:nvSpPr>
+        <p:spPr/>
+        <p:txBody>
+          <a:bodyPr/>
+          <a:lstStyle/>
+          <a:p>
+            <a:r>
+              <a:rPr lang="en-US" dirty="0"/>
+              <a:t>Model Recommendation</a:t>
+            </a:r>
+          </a:p>
+        </p:txBody>
+      </p:sp>
+      <p:sp>
+        <p:nvSpPr>
+          <p:cNvPr id="7" name="Content Placeholder 6">
+            <a:extLst>
+              <a:ext uri="{FF2B5EF4-FFF2-40B4-BE49-F238E27FC236}">
+                <a16:creationId xmlns:a16="http://schemas.microsoft.com/office/drawing/2014/main" id="{2F4B2FFC-C4CC-2500-E9FC-4712DAF55ECF}"/>
+              </a:ext>
+            </a:extLst>
+          </p:cNvPr>
+          <p:cNvSpPr>
+            <a:spLocks noGrp="1"/>
+          </p:cNvSpPr>
+          <p:nvPr>
+            <p:ph idx="1"/>
+          </p:nvPr>
+        </p:nvSpPr>
+        <p:spPr/>
+        <p:txBody>
+          <a:bodyPr/>
+          <a:lstStyle/>
+          <a:p>
+            <a:r>
+              <a:rPr lang="en-US" dirty="0"/>
+              <a:t>The base logistic regression model (without the introduction) of polynomial features is recommended for “production.”</a:t>
+            </a:r>
+          </a:p>
+          <a:p>
+            <a:r>
+              <a:rPr lang="en-US" dirty="0"/>
+              <a:t>This model minimized the number of false negatives while maintaining reasonable accuracy.  </a:t>
+            </a:r>
+          </a:p>
+        </p:txBody>
+      </p:sp>
+    </p:spTree>
+    <p:extLst>
+      <p:ext uri="{BB962C8B-B14F-4D97-AF65-F5344CB8AC3E}">
+        <p14:creationId xmlns:p14="http://schemas.microsoft.com/office/powerpoint/2010/main" val="1871893898"/>
+      </p:ext>
+    </p:extLst>
+  </p:cSld>
+  <p:clrMapOvr>
+    <a:masterClrMapping/>
+  </p:clrMapOvr>
+</p:sld>
+</file>
+
 <file path=ppt/slides/slide2.xml><?xml version="1.0" encoding="utf-8"?>
 <p:sld xmlns:a="http://schemas.openxmlformats.org/drawingml/2006/main" xmlns:r="http://schemas.openxmlformats.org/officeDocument/2006/relationships" xmlns:p="http://schemas.openxmlformats.org/presentationml/2006/main">
   <p:cSld>
@@ -4028,6 +5019,122 @@
     <p:extLst>
       <p:ext uri="{BB962C8B-B14F-4D97-AF65-F5344CB8AC3E}">
         <p14:creationId xmlns:p14="http://schemas.microsoft.com/office/powerpoint/2010/main" val="891000556"/>
+      </p:ext>
+    </p:extLst>
+  </p:cSld>
+  <p:clrMapOvr>
+    <a:masterClrMapping/>
+  </p:clrMapOvr>
+</p:sld>
+</file>
+
+<file path=ppt/slides/slide20.xml><?xml version="1.0" encoding="utf-8"?>
+<p:sld xmlns:a="http://schemas.openxmlformats.org/drawingml/2006/main" xmlns:r="http://schemas.openxmlformats.org/officeDocument/2006/relationships" xmlns:p="http://schemas.openxmlformats.org/presentationml/2006/main">
+  <p:cSld>
+    <p:spTree>
+      <p:nvGrpSpPr>
+        <p:cNvPr id="1" name=""/>
+        <p:cNvGrpSpPr/>
+        <p:nvPr/>
+      </p:nvGrpSpPr>
+      <p:grpSpPr>
+        <a:xfrm>
+          <a:off x="0" y="0"/>
+          <a:ext cx="0" cy="0"/>
+          <a:chOff x="0" y="0"/>
+          <a:chExt cx="0" cy="0"/>
+        </a:xfrm>
+      </p:grpSpPr>
+      <p:sp>
+        <p:nvSpPr>
+          <p:cNvPr id="2" name="Title 1">
+            <a:extLst>
+              <a:ext uri="{FF2B5EF4-FFF2-40B4-BE49-F238E27FC236}">
+                <a16:creationId xmlns:a16="http://schemas.microsoft.com/office/drawing/2014/main" id="{72EA1E96-2A6A-F6CC-28AC-BA3FD71032F0}"/>
+              </a:ext>
+            </a:extLst>
+          </p:cNvPr>
+          <p:cNvSpPr>
+            <a:spLocks noGrp="1"/>
+          </p:cNvSpPr>
+          <p:nvPr>
+            <p:ph type="title"/>
+          </p:nvPr>
+        </p:nvSpPr>
+        <p:spPr/>
+        <p:txBody>
+          <a:bodyPr/>
+          <a:lstStyle/>
+          <a:p>
+            <a:r>
+              <a:rPr lang="en-US" dirty="0"/>
+              <a:t>Next Steps</a:t>
+            </a:r>
+          </a:p>
+        </p:txBody>
+      </p:sp>
+      <p:sp>
+        <p:nvSpPr>
+          <p:cNvPr id="3" name="Content Placeholder 2">
+            <a:extLst>
+              <a:ext uri="{FF2B5EF4-FFF2-40B4-BE49-F238E27FC236}">
+                <a16:creationId xmlns:a16="http://schemas.microsoft.com/office/drawing/2014/main" id="{D9699069-365D-6B35-3D22-5CB406F13815}"/>
+              </a:ext>
+            </a:extLst>
+          </p:cNvPr>
+          <p:cNvSpPr>
+            <a:spLocks noGrp="1"/>
+          </p:cNvSpPr>
+          <p:nvPr>
+            <p:ph idx="1"/>
+          </p:nvPr>
+        </p:nvSpPr>
+        <p:spPr/>
+        <p:txBody>
+          <a:bodyPr/>
+          <a:lstStyle/>
+          <a:p>
+            <a:r>
+              <a:rPr lang="en-US" dirty="0"/>
+              <a:t>Additional classification models could be used.</a:t>
+            </a:r>
+          </a:p>
+          <a:p>
+            <a:pPr lvl="1"/>
+            <a:r>
+              <a:rPr lang="en-US" dirty="0"/>
+              <a:t>Ensemble methods, boosting, stacking, neural nets, </a:t>
+            </a:r>
+            <a:r>
+              <a:rPr lang="en-US" dirty="0" err="1"/>
+              <a:t>etc</a:t>
+            </a:r>
+            <a:endParaRPr lang="en-US" dirty="0"/>
+          </a:p>
+          <a:p>
+            <a:r>
+              <a:rPr lang="en-US" dirty="0"/>
+              <a:t>If working with the same data, a different number of folds can be tried for cross validation.  </a:t>
+            </a:r>
+          </a:p>
+          <a:p>
+            <a:r>
+              <a:rPr lang="en-US" dirty="0"/>
+              <a:t>Different scoring metrics can be studied and applied to the models.</a:t>
+            </a:r>
+          </a:p>
+          <a:p>
+            <a:pPr marL="0" indent="0">
+              <a:buNone/>
+            </a:pPr>
+            <a:endParaRPr lang="en-US" dirty="0"/>
+          </a:p>
+        </p:txBody>
+      </p:sp>
+    </p:spTree>
+    <p:extLst>
+      <p:ext uri="{BB962C8B-B14F-4D97-AF65-F5344CB8AC3E}">
+        <p14:creationId xmlns:p14="http://schemas.microsoft.com/office/powerpoint/2010/main" val="1372394367"/>
       </p:ext>
     </p:extLst>
   </p:cSld>
@@ -4059,7 +5166,7 @@
           <p:cNvPr id="2" name="Title 1">
             <a:extLst>
               <a:ext uri="{FF2B5EF4-FFF2-40B4-BE49-F238E27FC236}">
-                <a16:creationId xmlns:a16="http://schemas.microsoft.com/office/drawing/2014/main" id="{58BA9911-DBB9-5A2F-E2C4-DE162ED682BB}"/>
+                <a16:creationId xmlns:a16="http://schemas.microsoft.com/office/drawing/2014/main" id="{C9640273-6D27-4CB4-63EA-CCED87E2621D}"/>
               </a:ext>
             </a:extLst>
           </p:cNvPr>
@@ -4077,7 +5184,7 @@
           <a:p>
             <a:r>
               <a:rPr lang="en-US" dirty="0"/>
-              <a:t>Feature Descriptions – As Published on Kaggle</a:t>
+              <a:t>Overview</a:t>
             </a:r>
           </a:p>
         </p:txBody>
@@ -4087,7 +5194,7 @@
           <p:cNvPr id="3" name="Content Placeholder 2">
             <a:extLst>
               <a:ext uri="{FF2B5EF4-FFF2-40B4-BE49-F238E27FC236}">
-                <a16:creationId xmlns:a16="http://schemas.microsoft.com/office/drawing/2014/main" id="{81087CAE-77F4-3C53-4B08-FE0045A0351A}"/>
+                <a16:creationId xmlns:a16="http://schemas.microsoft.com/office/drawing/2014/main" id="{C659600B-1420-25E2-D66C-AFCF75F2C4A8}"/>
               </a:ext>
             </a:extLst>
           </p:cNvPr>
@@ -4100,270 +5207,48 @@
         </p:nvSpPr>
         <p:spPr/>
         <p:txBody>
-          <a:bodyPr>
-            <a:normAutofit fontScale="55000" lnSpcReduction="20000"/>
-          </a:bodyPr>
-          <a:lstStyle/>
-          <a:p>
-            <a:pPr algn="l" fontAlgn="base">
-              <a:buFont typeface="+mj-lt"/>
-              <a:buAutoNum type="arabicPeriod"/>
-            </a:pPr>
-            <a:r>
-              <a:rPr lang="en-US" b="0" i="0" dirty="0">
-                <a:effectLst/>
-                <a:latin typeface="Inter"/>
-              </a:rPr>
-              <a:t>Age: age of the patient [years]</a:t>
-            </a:r>
-          </a:p>
-          <a:p>
-            <a:pPr algn="l" fontAlgn="base">
-              <a:buFont typeface="+mj-lt"/>
-              <a:buAutoNum type="arabicPeriod"/>
-            </a:pPr>
-            <a:r>
-              <a:rPr lang="en-US" b="0" i="0" dirty="0">
-                <a:effectLst/>
-                <a:latin typeface="Inter"/>
-              </a:rPr>
-              <a:t>Sex: sex of the patient [M: Male, F: Female]</a:t>
-            </a:r>
-          </a:p>
-          <a:p>
-            <a:pPr algn="l" fontAlgn="base">
-              <a:buFont typeface="+mj-lt"/>
-              <a:buAutoNum type="arabicPeriod"/>
-            </a:pPr>
-            <a:r>
-              <a:rPr lang="en-US" b="0" i="0" dirty="0" err="1">
-                <a:effectLst/>
-                <a:latin typeface="Inter"/>
-              </a:rPr>
-              <a:t>ChestPainType</a:t>
-            </a:r>
-            <a:r>
-              <a:rPr lang="en-US" b="0" i="0" dirty="0">
-                <a:effectLst/>
-                <a:latin typeface="Inter"/>
-              </a:rPr>
-              <a:t>: chest pain type [TA: Typical Angina, ATA: Atypical Angina, NAP: Non-Anginal Pain, ASY: Asymptomatic]</a:t>
-            </a:r>
-          </a:p>
-          <a:p>
-            <a:pPr algn="l" fontAlgn="base">
-              <a:buFont typeface="+mj-lt"/>
-              <a:buAutoNum type="arabicPeriod"/>
-            </a:pPr>
-            <a:r>
-              <a:rPr lang="en-US" b="0" i="0" dirty="0" err="1">
-                <a:effectLst/>
-                <a:latin typeface="Inter"/>
-              </a:rPr>
-              <a:t>RestingBP</a:t>
-            </a:r>
-            <a:r>
-              <a:rPr lang="en-US" b="0" i="0" dirty="0">
-                <a:effectLst/>
-                <a:latin typeface="Inter"/>
-              </a:rPr>
-              <a:t>: resting blood pressure [mm Hg]</a:t>
-            </a:r>
-          </a:p>
-          <a:p>
-            <a:pPr algn="l" fontAlgn="base">
-              <a:buFont typeface="+mj-lt"/>
-              <a:buAutoNum type="arabicPeriod"/>
-            </a:pPr>
-            <a:r>
-              <a:rPr lang="en-US" b="0" i="0" dirty="0">
-                <a:effectLst/>
-                <a:latin typeface="Inter"/>
-              </a:rPr>
-              <a:t>Cholesterol: serum cholesterol [mm/dl]</a:t>
-            </a:r>
-          </a:p>
-          <a:p>
-            <a:pPr algn="l" fontAlgn="base">
-              <a:buFont typeface="+mj-lt"/>
-              <a:buAutoNum type="arabicPeriod"/>
-            </a:pPr>
-            <a:r>
-              <a:rPr lang="en-US" b="0" i="0" dirty="0" err="1">
-                <a:effectLst/>
-                <a:latin typeface="Inter"/>
-              </a:rPr>
-              <a:t>FastingBS</a:t>
-            </a:r>
-            <a:r>
-              <a:rPr lang="en-US" b="0" i="0" dirty="0">
-                <a:effectLst/>
-                <a:latin typeface="Inter"/>
-              </a:rPr>
-              <a:t>: fasting blood sugar [1: if </a:t>
-            </a:r>
-            <a:r>
-              <a:rPr lang="en-US" b="0" i="0" dirty="0" err="1">
-                <a:effectLst/>
-                <a:latin typeface="Inter"/>
-              </a:rPr>
-              <a:t>FastingBS</a:t>
-            </a:r>
-            <a:r>
-              <a:rPr lang="en-US" b="0" i="0" dirty="0">
-                <a:effectLst/>
-                <a:latin typeface="Inter"/>
-              </a:rPr>
-              <a:t> &gt; 120 mg/dl, 0: otherwise]</a:t>
-            </a:r>
-          </a:p>
-          <a:p>
-            <a:pPr algn="l" fontAlgn="base">
-              <a:buFont typeface="+mj-lt"/>
-              <a:buAutoNum type="arabicPeriod"/>
-            </a:pPr>
-            <a:r>
-              <a:rPr lang="en-US" b="0" i="0" dirty="0" err="1">
-                <a:effectLst/>
-                <a:latin typeface="Inter"/>
-              </a:rPr>
-              <a:t>RestingECG</a:t>
-            </a:r>
-            <a:r>
-              <a:rPr lang="en-US" b="0" i="0" dirty="0">
-                <a:effectLst/>
-                <a:latin typeface="Inter"/>
-              </a:rPr>
-              <a:t>: resting electrocardiogram results [Normal: Normal, ST: having ST-T wave abnormality (T wave inversions and/or ST elevation or depression of &gt; 0.05 mV), LVH: showing probable or definite left ventricular hypertrophy by Estes' criteria]</a:t>
-            </a:r>
-          </a:p>
-          <a:p>
-            <a:pPr algn="l" fontAlgn="base">
-              <a:buFont typeface="+mj-lt"/>
-              <a:buAutoNum type="arabicPeriod"/>
-            </a:pPr>
-            <a:r>
-              <a:rPr lang="en-US" b="0" i="0" dirty="0" err="1">
-                <a:effectLst/>
-                <a:latin typeface="Inter"/>
-              </a:rPr>
-              <a:t>MaxHR</a:t>
-            </a:r>
-            <a:r>
-              <a:rPr lang="en-US" b="0" i="0" dirty="0">
-                <a:effectLst/>
-                <a:latin typeface="Inter"/>
-              </a:rPr>
-              <a:t>: maximum heart rate achieved [Numeric value between 60 and 202]</a:t>
-            </a:r>
-          </a:p>
-          <a:p>
-            <a:pPr algn="l" fontAlgn="base">
-              <a:buFont typeface="+mj-lt"/>
-              <a:buAutoNum type="arabicPeriod"/>
-            </a:pPr>
-            <a:r>
-              <a:rPr lang="en-US" b="0" i="0" dirty="0" err="1">
-                <a:effectLst/>
-                <a:latin typeface="Inter"/>
-              </a:rPr>
-              <a:t>ExerciseAngina</a:t>
-            </a:r>
-            <a:r>
-              <a:rPr lang="en-US" b="0" i="0" dirty="0">
-                <a:effectLst/>
-                <a:latin typeface="Inter"/>
-              </a:rPr>
-              <a:t>: exercise-induced angina [Y: Yes, N: No]</a:t>
-            </a:r>
-          </a:p>
-          <a:p>
-            <a:pPr algn="l" fontAlgn="base">
-              <a:buFont typeface="+mj-lt"/>
-              <a:buAutoNum type="arabicPeriod"/>
-            </a:pPr>
-            <a:r>
-              <a:rPr lang="en-US" b="0" i="0" dirty="0" err="1">
-                <a:effectLst/>
-                <a:latin typeface="Inter"/>
-              </a:rPr>
-              <a:t>Oldpeak</a:t>
-            </a:r>
-            <a:r>
-              <a:rPr lang="en-US" b="0" i="0" dirty="0">
-                <a:effectLst/>
-                <a:latin typeface="Inter"/>
-              </a:rPr>
-              <a:t>: </a:t>
-            </a:r>
-            <a:r>
-              <a:rPr lang="en-US" b="0" i="0" dirty="0" err="1">
-                <a:effectLst/>
-                <a:latin typeface="Inter"/>
-              </a:rPr>
-              <a:t>oldpeak</a:t>
-            </a:r>
-            <a:r>
-              <a:rPr lang="en-US" b="0" i="0" dirty="0">
-                <a:effectLst/>
-                <a:latin typeface="Inter"/>
-              </a:rPr>
-              <a:t> = ST [Numeric value measured in depression]</a:t>
-            </a:r>
-          </a:p>
-          <a:p>
-            <a:pPr algn="l" fontAlgn="base">
-              <a:buFont typeface="+mj-lt"/>
-              <a:buAutoNum type="arabicPeriod"/>
-            </a:pPr>
-            <a:r>
-              <a:rPr lang="en-US" b="0" i="0" dirty="0" err="1">
-                <a:effectLst/>
-                <a:latin typeface="Inter"/>
-              </a:rPr>
-              <a:t>ST_Slope</a:t>
-            </a:r>
-            <a:r>
-              <a:rPr lang="en-US" b="0" i="0" dirty="0">
-                <a:effectLst/>
-                <a:latin typeface="Inter"/>
-              </a:rPr>
-              <a:t>: the slope of the peak exercise ST segment [Up: upsloping, Flat: flat, Down: </a:t>
-            </a:r>
-            <a:r>
-              <a:rPr lang="en-US" b="0" i="0" dirty="0" err="1">
-                <a:effectLst/>
-                <a:latin typeface="Inter"/>
-              </a:rPr>
-              <a:t>downsloping</a:t>
-            </a:r>
-            <a:r>
-              <a:rPr lang="en-US" b="0" i="0" dirty="0">
-                <a:effectLst/>
-                <a:latin typeface="Inter"/>
-              </a:rPr>
-              <a:t>]</a:t>
-            </a:r>
-          </a:p>
-          <a:p>
-            <a:pPr algn="l" fontAlgn="base">
-              <a:buFont typeface="+mj-lt"/>
-              <a:buAutoNum type="arabicPeriod"/>
-            </a:pPr>
-            <a:r>
-              <a:rPr lang="en-US" b="0" i="0" dirty="0" err="1">
-                <a:effectLst/>
-                <a:latin typeface="Inter"/>
-              </a:rPr>
+          <a:bodyPr/>
+          <a:lstStyle/>
+          <a:p>
+            <a:r>
+              <a:rPr lang="en-US" dirty="0"/>
+              <a:t>The dataset contains 918 observations.  Of these observations, 508 have been previously diagnosed with heart disease [</a:t>
+            </a:r>
+            <a:r>
+              <a:rPr lang="en-US" dirty="0" err="1"/>
               <a:t>HeartDisease</a:t>
             </a:r>
             <a:r>
-              <a:rPr lang="en-US" b="0" i="0" dirty="0">
-                <a:effectLst/>
-                <a:latin typeface="Inter"/>
-              </a:rPr>
-              <a:t>: output class [1: heart disease, 0: Normal]</a:t>
-            </a:r>
+              <a:rPr lang="en-US" dirty="0"/>
+              <a:t> = 1].</a:t>
+            </a:r>
+          </a:p>
+          <a:p>
+            <a:pPr lvl="1"/>
+            <a:r>
+              <a:rPr lang="en-US" dirty="0"/>
+              <a:t>This dataset is balanced.  </a:t>
+            </a:r>
+          </a:p>
+          <a:p>
+            <a:r>
+              <a:rPr lang="en-US" dirty="0"/>
+              <a:t>Link to data:</a:t>
+            </a:r>
+          </a:p>
+          <a:p>
+            <a:pPr lvl="1"/>
+            <a:r>
+              <a:rPr lang="en-US" dirty="0"/>
+              <a:t>https://www.kaggle.com/datasets/fedesoriano/heart-failure-prediction</a:t>
+            </a:r>
+          </a:p>
+          <a:p>
+            <a:pPr lvl="1"/>
+            <a:endParaRPr lang="en-US" dirty="0"/>
+          </a:p>
+          <a:p>
+            <a:endParaRPr lang="en-US" dirty="0"/>
           </a:p>
           <a:p>
             <a:endParaRPr lang="en-US" dirty="0"/>
@@ -4373,7 +5258,7 @@
     </p:spTree>
     <p:extLst>
       <p:ext uri="{BB962C8B-B14F-4D97-AF65-F5344CB8AC3E}">
-        <p14:creationId xmlns:p14="http://schemas.microsoft.com/office/powerpoint/2010/main" val="3705431547"/>
+        <p14:creationId xmlns:p14="http://schemas.microsoft.com/office/powerpoint/2010/main" val="419036802"/>
       </p:ext>
     </p:extLst>
   </p:cSld>
@@ -4405,7 +5290,7 @@
           <p:cNvPr id="2" name="Title 1">
             <a:extLst>
               <a:ext uri="{FF2B5EF4-FFF2-40B4-BE49-F238E27FC236}">
-                <a16:creationId xmlns:a16="http://schemas.microsoft.com/office/drawing/2014/main" id="{5CF84EED-676F-A01D-3F43-F8E050603AFA}"/>
+                <a16:creationId xmlns:a16="http://schemas.microsoft.com/office/drawing/2014/main" id="{58BA9911-DBB9-5A2F-E2C4-DE162ED682BB}"/>
               </a:ext>
             </a:extLst>
           </p:cNvPr>
@@ -4423,7 +5308,7 @@
           <a:p>
             <a:r>
               <a:rPr lang="en-US" dirty="0"/>
-              <a:t>Feature Descriptions - Clarifications</a:t>
+              <a:t>Feature Descriptions – As Published on Kaggle</a:t>
             </a:r>
           </a:p>
         </p:txBody>
@@ -4433,7 +5318,7 @@
           <p:cNvPr id="3" name="Content Placeholder 2">
             <a:extLst>
               <a:ext uri="{FF2B5EF4-FFF2-40B4-BE49-F238E27FC236}">
-                <a16:creationId xmlns:a16="http://schemas.microsoft.com/office/drawing/2014/main" id="{5C7531D2-2E54-B384-7E8D-E36218FA1E1B}"/>
+                <a16:creationId xmlns:a16="http://schemas.microsoft.com/office/drawing/2014/main" id="{81087CAE-77F4-3C53-4B08-FE0045A0351A}"/>
               </a:ext>
             </a:extLst>
           </p:cNvPr>
@@ -4446,99 +5331,272 @@
         </p:nvSpPr>
         <p:spPr/>
         <p:txBody>
-          <a:bodyPr/>
-          <a:lstStyle/>
-          <a:p>
-            <a:r>
-              <a:rPr lang="en-US" dirty="0"/>
-              <a:t>Chest Pain Type</a:t>
-            </a:r>
-          </a:p>
-          <a:p>
-            <a:pPr lvl="1"/>
-            <a:r>
-              <a:rPr lang="en-US" dirty="0"/>
-              <a:t>Typical Angina [TA] </a:t>
-            </a:r>
-          </a:p>
-          <a:p>
-            <a:pPr marL="1371600" lvl="2" indent="-457200">
+          <a:bodyPr>
+            <a:normAutofit fontScale="55000" lnSpcReduction="20000"/>
+          </a:bodyPr>
+          <a:lstStyle/>
+          <a:p>
+            <a:pPr algn="l" fontAlgn="base">
               <a:buFont typeface="+mj-lt"/>
               <a:buAutoNum type="arabicPeriod"/>
             </a:pPr>
             <a:r>
-              <a:rPr lang="en-US" dirty="0"/>
-              <a:t>Substernal pain </a:t>
-            </a:r>
-          </a:p>
-          <a:p>
-            <a:pPr marL="1371600" lvl="2" indent="-457200">
+              <a:rPr lang="en-US" b="0" i="0" dirty="0">
+                <a:effectLst/>
+                <a:latin typeface="Inter"/>
+              </a:rPr>
+              <a:t>Age: age of the patient [years]</a:t>
+            </a:r>
+          </a:p>
+          <a:p>
+            <a:pPr algn="l" fontAlgn="base">
               <a:buFont typeface="+mj-lt"/>
               <a:buAutoNum type="arabicPeriod"/>
             </a:pPr>
             <a:r>
-              <a:rPr lang="en-US" dirty="0"/>
-              <a:t>brought on by exertion or emotional stress</a:t>
-            </a:r>
-          </a:p>
-          <a:p>
-            <a:pPr marL="1371600" lvl="2" indent="-457200">
+              <a:rPr lang="en-US" b="0" i="0" dirty="0">
+                <a:effectLst/>
+                <a:latin typeface="Inter"/>
+              </a:rPr>
+              <a:t>Sex: sex of the patient [M: Male, F: Female]</a:t>
+            </a:r>
+          </a:p>
+          <a:p>
+            <a:pPr algn="l" fontAlgn="base">
               <a:buFont typeface="+mj-lt"/>
               <a:buAutoNum type="arabicPeriod"/>
             </a:pPr>
             <a:r>
-              <a:rPr lang="en-US" dirty="0"/>
-              <a:t>Relieved by stopping activity or administering </a:t>
-            </a:r>
-            <a:r>
-              <a:rPr lang="en-US" dirty="0" err="1"/>
-              <a:t>nitroglycerides</a:t>
-            </a:r>
-            <a:r>
-              <a:rPr lang="en-US" dirty="0"/>
-              <a:t>.</a:t>
-            </a:r>
-          </a:p>
-          <a:p>
-            <a:pPr lvl="1"/>
-            <a:r>
-              <a:rPr lang="en-US" dirty="0"/>
-              <a:t>Atypical Angina [ATA] </a:t>
-            </a:r>
-          </a:p>
-          <a:p>
-            <a:pPr lvl="2"/>
-            <a:r>
-              <a:rPr lang="en-US" dirty="0"/>
-              <a:t>When 2 of the 3 typical angina symptoms are present</a:t>
-            </a:r>
-          </a:p>
-          <a:p>
-            <a:pPr lvl="1"/>
-            <a:r>
-              <a:rPr lang="en-US" dirty="0"/>
-              <a:t>Non-Anginal Pain</a:t>
-            </a:r>
-          </a:p>
-          <a:p>
-            <a:pPr lvl="2"/>
-            <a:r>
-              <a:rPr lang="en-US" dirty="0"/>
-              <a:t>Pain that occurs near the heart without being related to heart disease.</a:t>
-            </a:r>
-          </a:p>
-          <a:p>
-            <a:pPr marL="914400" lvl="2" indent="0">
-              <a:buNone/>
+              <a:rPr lang="en-US" b="0" i="0" dirty="0" err="1">
+                <a:effectLst/>
+                <a:latin typeface="Inter"/>
+              </a:rPr>
+              <a:t>ChestPainType</a:t>
+            </a:r>
+            <a:r>
+              <a:rPr lang="en-US" b="0" i="0" dirty="0">
+                <a:effectLst/>
+                <a:latin typeface="Inter"/>
+              </a:rPr>
+              <a:t>: chest pain type [TA: Typical Angina, ATA: Atypical Angina, NAP: Non-Anginal Pain, ASY: Asymptomatic]</a:t>
+            </a:r>
+          </a:p>
+          <a:p>
+            <a:pPr algn="l" fontAlgn="base">
+              <a:buFont typeface="+mj-lt"/>
+              <a:buAutoNum type="arabicPeriod"/>
             </a:pPr>
-            <a:endParaRPr lang="en-US" dirty="0"/>
-          </a:p>
-          <a:p>
-            <a:pPr lvl="1"/>
-            <a:endParaRPr lang="en-US" dirty="0"/>
-          </a:p>
-          <a:p>
-            <a:pPr lvl="1"/>
+            <a:r>
+              <a:rPr lang="en-US" b="0" i="0" dirty="0" err="1">
+                <a:effectLst/>
+                <a:latin typeface="Inter"/>
+              </a:rPr>
+              <a:t>RestingBP</a:t>
+            </a:r>
+            <a:r>
+              <a:rPr lang="en-US" b="0" i="0" dirty="0">
+                <a:effectLst/>
+                <a:latin typeface="Inter"/>
+              </a:rPr>
+              <a:t>: resting blood pressure [mm Hg]</a:t>
+            </a:r>
+          </a:p>
+          <a:p>
+            <a:pPr algn="l" fontAlgn="base">
+              <a:buFont typeface="+mj-lt"/>
+              <a:buAutoNum type="arabicPeriod"/>
+            </a:pPr>
+            <a:r>
+              <a:rPr lang="en-US" b="0" i="0" dirty="0">
+                <a:effectLst/>
+                <a:latin typeface="Inter"/>
+              </a:rPr>
+              <a:t>Cholesterol: serum cholesterol [mm/dl]</a:t>
+            </a:r>
+          </a:p>
+          <a:p>
+            <a:pPr algn="l" fontAlgn="base">
+              <a:buFont typeface="+mj-lt"/>
+              <a:buAutoNum type="arabicPeriod"/>
+            </a:pPr>
+            <a:r>
+              <a:rPr lang="en-US" b="0" i="0" dirty="0" err="1">
+                <a:effectLst/>
+                <a:latin typeface="Inter"/>
+              </a:rPr>
+              <a:t>FastingBS</a:t>
+            </a:r>
+            <a:r>
+              <a:rPr lang="en-US" b="0" i="0" dirty="0">
+                <a:effectLst/>
+                <a:latin typeface="Inter"/>
+              </a:rPr>
+              <a:t>: fasting blood sugar [1: if </a:t>
+            </a:r>
+            <a:r>
+              <a:rPr lang="en-US" b="0" i="0" dirty="0" err="1">
+                <a:effectLst/>
+                <a:latin typeface="Inter"/>
+              </a:rPr>
+              <a:t>FastingBS</a:t>
+            </a:r>
+            <a:r>
+              <a:rPr lang="en-US" b="0" i="0" dirty="0">
+                <a:effectLst/>
+                <a:latin typeface="Inter"/>
+              </a:rPr>
+              <a:t> &gt; 120 mg/dl, 0: otherwise]</a:t>
+            </a:r>
+          </a:p>
+          <a:p>
+            <a:pPr algn="l" fontAlgn="base">
+              <a:buFont typeface="+mj-lt"/>
+              <a:buAutoNum type="arabicPeriod"/>
+            </a:pPr>
+            <a:r>
+              <a:rPr lang="en-US" b="0" i="0" dirty="0" err="1">
+                <a:effectLst/>
+                <a:latin typeface="Inter"/>
+              </a:rPr>
+              <a:t>RestingECG</a:t>
+            </a:r>
+            <a:r>
+              <a:rPr lang="en-US" b="0" i="0" dirty="0">
+                <a:effectLst/>
+                <a:latin typeface="Inter"/>
+              </a:rPr>
+              <a:t>: resting electrocardiogram results [Normal: Normal, ST: having ST-T wave abnormality (T wave inversions and/or ST elevation or depression of &gt; 0.05 mV), LVH: showing probable or definite left ventricular hypertrophy by Estes' criteria]</a:t>
+            </a:r>
+          </a:p>
+          <a:p>
+            <a:pPr algn="l" fontAlgn="base">
+              <a:buFont typeface="+mj-lt"/>
+              <a:buAutoNum type="arabicPeriod"/>
+            </a:pPr>
+            <a:r>
+              <a:rPr lang="en-US" b="0" i="0" dirty="0" err="1">
+                <a:effectLst/>
+                <a:latin typeface="Inter"/>
+              </a:rPr>
+              <a:t>MaxHR</a:t>
+            </a:r>
+            <a:r>
+              <a:rPr lang="en-US" b="0" i="0" dirty="0">
+                <a:effectLst/>
+                <a:latin typeface="Inter"/>
+              </a:rPr>
+              <a:t>: maximum heart rate achieved [Numeric value between 60 and 202]</a:t>
+            </a:r>
+          </a:p>
+          <a:p>
+            <a:pPr algn="l" fontAlgn="base">
+              <a:buFont typeface="+mj-lt"/>
+              <a:buAutoNum type="arabicPeriod"/>
+            </a:pPr>
+            <a:r>
+              <a:rPr lang="en-US" b="0" i="0" dirty="0" err="1">
+                <a:effectLst/>
+                <a:latin typeface="Inter"/>
+              </a:rPr>
+              <a:t>ExerciseAngina</a:t>
+            </a:r>
+            <a:r>
+              <a:rPr lang="en-US" b="0" i="0" dirty="0">
+                <a:effectLst/>
+                <a:latin typeface="Inter"/>
+              </a:rPr>
+              <a:t>: exercise-induced angina [Y: Yes, N: No]</a:t>
+            </a:r>
+          </a:p>
+          <a:p>
+            <a:pPr algn="l" fontAlgn="base">
+              <a:buFont typeface="+mj-lt"/>
+              <a:buAutoNum type="arabicPeriod"/>
+            </a:pPr>
+            <a:r>
+              <a:rPr lang="en-US" b="0" i="0" dirty="0" err="1">
+                <a:effectLst/>
+                <a:latin typeface="Inter"/>
+              </a:rPr>
+              <a:t>Oldpeak</a:t>
+            </a:r>
+            <a:r>
+              <a:rPr lang="en-US" b="0" i="0" dirty="0">
+                <a:effectLst/>
+                <a:latin typeface="Inter"/>
+              </a:rPr>
+              <a:t>: </a:t>
+            </a:r>
+            <a:r>
+              <a:rPr lang="en-US" b="0" i="0" dirty="0" err="1">
+                <a:effectLst/>
+                <a:latin typeface="Inter"/>
+              </a:rPr>
+              <a:t>oldpeak</a:t>
+            </a:r>
+            <a:r>
+              <a:rPr lang="en-US" b="0" i="0" dirty="0">
+                <a:effectLst/>
+                <a:latin typeface="Inter"/>
+              </a:rPr>
+              <a:t> = ST [Numeric value measured in depression]</a:t>
+            </a:r>
+          </a:p>
+          <a:p>
+            <a:pPr algn="l" fontAlgn="base">
+              <a:buFont typeface="+mj-lt"/>
+              <a:buAutoNum type="arabicPeriod"/>
+            </a:pPr>
+            <a:r>
+              <a:rPr lang="en-US" b="0" i="0" dirty="0" err="1">
+                <a:effectLst/>
+                <a:latin typeface="Inter"/>
+              </a:rPr>
+              <a:t>ST_Slope</a:t>
+            </a:r>
+            <a:r>
+              <a:rPr lang="en-US" b="0" i="0" dirty="0">
+                <a:effectLst/>
+                <a:latin typeface="Inter"/>
+              </a:rPr>
+              <a:t>: the slope of the peak exercise ST segment [Up: upsloping, Flat: flat, Down: </a:t>
+            </a:r>
+            <a:r>
+              <a:rPr lang="en-US" b="0" i="0" dirty="0" err="1">
+                <a:effectLst/>
+                <a:latin typeface="Inter"/>
+              </a:rPr>
+              <a:t>downsloping</a:t>
+            </a:r>
+            <a:r>
+              <a:rPr lang="en-US" b="0" i="0" dirty="0">
+                <a:effectLst/>
+                <a:latin typeface="Inter"/>
+              </a:rPr>
+              <a:t>]</a:t>
+            </a:r>
+          </a:p>
+          <a:p>
+            <a:pPr algn="l" fontAlgn="base">
+              <a:buFont typeface="+mj-lt"/>
+              <a:buAutoNum type="arabicPeriod"/>
+            </a:pPr>
+            <a:r>
+              <a:rPr lang="en-US" b="0" i="0" dirty="0" err="1">
+                <a:effectLst/>
+                <a:latin typeface="Inter"/>
+              </a:rPr>
+              <a:t>HeartDisease</a:t>
+            </a:r>
+            <a:r>
+              <a:rPr lang="en-US" b="0" i="0" dirty="0">
+                <a:effectLst/>
+                <a:latin typeface="Inter"/>
+              </a:rPr>
+              <a:t>: output class [1: heart disease, 0: Normal]</a:t>
+            </a:r>
+          </a:p>
+          <a:p>
             <a:endParaRPr lang="en-US" dirty="0"/>
           </a:p>
         </p:txBody>
@@ -4546,7 +5604,7 @@
     </p:spTree>
     <p:extLst>
       <p:ext uri="{BB962C8B-B14F-4D97-AF65-F5344CB8AC3E}">
-        <p14:creationId xmlns:p14="http://schemas.microsoft.com/office/powerpoint/2010/main" val="3143400036"/>
+        <p14:creationId xmlns:p14="http://schemas.microsoft.com/office/powerpoint/2010/main" val="3705431547"/>
       </p:ext>
     </p:extLst>
   </p:cSld>
@@ -4578,7 +5636,7 @@
           <p:cNvPr id="2" name="Title 1">
             <a:extLst>
               <a:ext uri="{FF2B5EF4-FFF2-40B4-BE49-F238E27FC236}">
-                <a16:creationId xmlns:a16="http://schemas.microsoft.com/office/drawing/2014/main" id="{2773996C-0901-9D45-85F4-CF6957628B39}"/>
+                <a16:creationId xmlns:a16="http://schemas.microsoft.com/office/drawing/2014/main" id="{5CF84EED-676F-A01D-3F43-F8E050603AFA}"/>
               </a:ext>
             </a:extLst>
           </p:cNvPr>
@@ -4606,7 +5664,7 @@
           <p:cNvPr id="3" name="Content Placeholder 2">
             <a:extLst>
               <a:ext uri="{FF2B5EF4-FFF2-40B4-BE49-F238E27FC236}">
-                <a16:creationId xmlns:a16="http://schemas.microsoft.com/office/drawing/2014/main" id="{C2C73491-8250-1273-BF06-1DD1DF5CF235}"/>
+                <a16:creationId xmlns:a16="http://schemas.microsoft.com/office/drawing/2014/main" id="{5C7531D2-2E54-B384-7E8D-E36218FA1E1B}"/>
               </a:ext>
             </a:extLst>
           </p:cNvPr>
@@ -4623,141 +5681,103 @@
           <a:lstStyle/>
           <a:p>
             <a:r>
-              <a:rPr lang="en-US" b="0" i="0" dirty="0">
-                <a:effectLst/>
-                <a:latin typeface="Inter"/>
-              </a:rPr>
-              <a:t>Resting Electrocardiogram [</a:t>
-            </a:r>
-            <a:r>
-              <a:rPr lang="en-US" b="0" i="0" dirty="0" err="1">
-                <a:effectLst/>
-                <a:latin typeface="Inter"/>
-              </a:rPr>
-              <a:t>RestingECG</a:t>
-            </a:r>
-            <a:r>
-              <a:rPr lang="en-US" b="0" i="0" dirty="0">
-                <a:effectLst/>
-                <a:latin typeface="Inter"/>
-              </a:rPr>
-              <a:t>]</a:t>
+              <a:rPr lang="en-US" dirty="0"/>
+              <a:t>Chest Pain Type</a:t>
             </a:r>
           </a:p>
           <a:p>
             <a:pPr lvl="1"/>
             <a:r>
-              <a:rPr lang="en-US" b="0" i="0" dirty="0">
-                <a:effectLst/>
-                <a:latin typeface="Inter"/>
-              </a:rPr>
-              <a:t>The </a:t>
-            </a:r>
-            <a:r>
-              <a:rPr lang="en-US" b="0" i="0" dirty="0" err="1">
-                <a:effectLst/>
-                <a:latin typeface="Inter"/>
-              </a:rPr>
-              <a:t>nonnomal</a:t>
-            </a:r>
-            <a:r>
-              <a:rPr lang="en-US" b="0" i="0" dirty="0">
-                <a:effectLst/>
-                <a:latin typeface="Inter"/>
-              </a:rPr>
-              <a:t> ca</a:t>
-            </a:r>
-            <a:r>
-              <a:rPr lang="en-US" dirty="0">
-                <a:latin typeface="Inter"/>
-              </a:rPr>
-              <a:t>tegories are results of an ECG.  Each is indicative of a different damage state of the heart.  i.e. Left </a:t>
-            </a:r>
-            <a:r>
-              <a:rPr lang="en-US" dirty="0" err="1">
-                <a:latin typeface="Inter"/>
-              </a:rPr>
-              <a:t>ventrical</a:t>
-            </a:r>
-            <a:r>
-              <a:rPr lang="en-US" dirty="0">
-                <a:latin typeface="Inter"/>
-              </a:rPr>
-              <a:t> hardening, myocardial </a:t>
-            </a:r>
-            <a:r>
-              <a:rPr lang="en-US" dirty="0" err="1">
-                <a:latin typeface="Inter"/>
-              </a:rPr>
-              <a:t>eschemia</a:t>
-            </a:r>
-            <a:r>
-              <a:rPr lang="en-US" dirty="0">
-                <a:latin typeface="Inter"/>
-              </a:rPr>
-              <a:t>, coronary artery occlusion.</a:t>
+              <a:rPr lang="en-US" dirty="0"/>
+              <a:t>Typical Angina [TA] </a:t>
+            </a:r>
+          </a:p>
+          <a:p>
+            <a:pPr marL="1371600" lvl="2" indent="-457200">
+              <a:buFont typeface="+mj-lt"/>
+              <a:buAutoNum type="arabicPeriod"/>
+            </a:pPr>
+            <a:r>
+              <a:rPr lang="en-US" dirty="0"/>
+              <a:t>Substernal pain </a:t>
+            </a:r>
+          </a:p>
+          <a:p>
+            <a:pPr marL="1371600" lvl="2" indent="-457200">
+              <a:buFont typeface="+mj-lt"/>
+              <a:buAutoNum type="arabicPeriod"/>
+            </a:pPr>
+            <a:r>
+              <a:rPr lang="en-US" dirty="0"/>
+              <a:t>brought on by exertion or emotional stress</a:t>
+            </a:r>
+          </a:p>
+          <a:p>
+            <a:pPr marL="1371600" lvl="2" indent="-457200">
+              <a:buFont typeface="+mj-lt"/>
+              <a:buAutoNum type="arabicPeriod"/>
+            </a:pPr>
+            <a:r>
+              <a:rPr lang="en-US" dirty="0"/>
+              <a:t>Relieved by stopping activity or administering </a:t>
+            </a:r>
+            <a:r>
+              <a:rPr lang="en-US" dirty="0" err="1"/>
+              <a:t>nitroglycerides</a:t>
+            </a:r>
+            <a:r>
+              <a:rPr lang="en-US" dirty="0"/>
+              <a:t>.</a:t>
             </a:r>
           </a:p>
           <a:p>
             <a:pPr lvl="1"/>
             <a:r>
-              <a:rPr lang="en-US" b="0" i="0" dirty="0">
-                <a:effectLst/>
-                <a:latin typeface="Inter"/>
-              </a:rPr>
-              <a:t>The ST keyword has di</a:t>
-            </a:r>
-            <a:r>
-              <a:rPr lang="en-US" dirty="0">
-                <a:latin typeface="Inter"/>
-              </a:rPr>
-              <a:t>fferent abnormalities lumped into this feature.  This will not be an issue for modelling since the models need not be fully interpretable for this academic exercise.</a:t>
-            </a:r>
-          </a:p>
-          <a:p>
-            <a:r>
-              <a:rPr lang="en-US" dirty="0"/>
-              <a:t>Exercise-Induced Angina [</a:t>
-            </a:r>
-            <a:r>
-              <a:rPr lang="en-US" dirty="0" err="1"/>
-              <a:t>ExerciseAngina</a:t>
-            </a:r>
-            <a:r>
-              <a:rPr lang="en-US" dirty="0"/>
-              <a:t>]</a:t>
+              <a:rPr lang="en-US" dirty="0"/>
+              <a:t>Atypical Angina [ATA] </a:t>
+            </a:r>
+          </a:p>
+          <a:p>
+            <a:pPr lvl="2"/>
+            <a:r>
+              <a:rPr lang="en-US" dirty="0"/>
+              <a:t>When 2 of the 3 typical angina symptoms are present</a:t>
             </a:r>
           </a:p>
           <a:p>
             <a:pPr lvl="1"/>
             <a:r>
-              <a:rPr lang="en-US" dirty="0" err="1"/>
-              <a:t>Oldpeak</a:t>
-            </a:r>
-            <a:r>
-              <a:rPr lang="en-US" dirty="0"/>
-              <a:t> and </a:t>
-            </a:r>
-            <a:r>
-              <a:rPr lang="en-US" dirty="0" err="1"/>
-              <a:t>ST_Slope</a:t>
-            </a:r>
-            <a:r>
-              <a:rPr lang="en-US" dirty="0"/>
-              <a:t> features describe the ECG taken during exercise.  </a:t>
-            </a:r>
-          </a:p>
-          <a:p>
-            <a:endParaRPr lang="en-US" dirty="0">
-              <a:latin typeface="Inter"/>
-            </a:endParaRPr>
+              <a:rPr lang="en-US" dirty="0"/>
+              <a:t>Non-Anginal Pain</a:t>
+            </a:r>
+          </a:p>
+          <a:p>
+            <a:pPr lvl="2"/>
+            <a:r>
+              <a:rPr lang="en-US" dirty="0"/>
+              <a:t>Pain that occurs near the heart without being related to heart disease.</a:t>
+            </a:r>
+          </a:p>
+          <a:p>
+            <a:pPr marL="914400" lvl="2" indent="0">
+              <a:buNone/>
+            </a:pPr>
+            <a:endParaRPr lang="en-US" dirty="0"/>
+          </a:p>
+          <a:p>
+            <a:pPr lvl="1"/>
+            <a:endParaRPr lang="en-US" dirty="0"/>
+          </a:p>
+          <a:p>
+            <a:pPr lvl="1"/>
+            <a:endParaRPr lang="en-US" dirty="0"/>
           </a:p>
         </p:txBody>
       </p:sp>
     </p:spTree>
     <p:extLst>
       <p:ext uri="{BB962C8B-B14F-4D97-AF65-F5344CB8AC3E}">
-        <p14:creationId xmlns:p14="http://schemas.microsoft.com/office/powerpoint/2010/main" val="1670110530"/>
+        <p14:creationId xmlns:p14="http://schemas.microsoft.com/office/powerpoint/2010/main" val="3143400036"/>
       </p:ext>
     </p:extLst>
   </p:cSld>
@@ -4789,6 +5809,203 @@
           <p:cNvPr id="2" name="Title 1">
             <a:extLst>
               <a:ext uri="{FF2B5EF4-FFF2-40B4-BE49-F238E27FC236}">
+                <a16:creationId xmlns:a16="http://schemas.microsoft.com/office/drawing/2014/main" id="{2773996C-0901-9D45-85F4-CF6957628B39}"/>
+              </a:ext>
+            </a:extLst>
+          </p:cNvPr>
+          <p:cNvSpPr>
+            <a:spLocks noGrp="1"/>
+          </p:cNvSpPr>
+          <p:nvPr>
+            <p:ph type="title"/>
+          </p:nvPr>
+        </p:nvSpPr>
+        <p:spPr/>
+        <p:txBody>
+          <a:bodyPr/>
+          <a:lstStyle/>
+          <a:p>
+            <a:r>
+              <a:rPr lang="en-US" dirty="0"/>
+              <a:t>Feature Descriptions - Clarifications</a:t>
+            </a:r>
+          </a:p>
+        </p:txBody>
+      </p:sp>
+      <p:sp>
+        <p:nvSpPr>
+          <p:cNvPr id="3" name="Content Placeholder 2">
+            <a:extLst>
+              <a:ext uri="{FF2B5EF4-FFF2-40B4-BE49-F238E27FC236}">
+                <a16:creationId xmlns:a16="http://schemas.microsoft.com/office/drawing/2014/main" id="{C2C73491-8250-1273-BF06-1DD1DF5CF235}"/>
+              </a:ext>
+            </a:extLst>
+          </p:cNvPr>
+          <p:cNvSpPr>
+            <a:spLocks noGrp="1"/>
+          </p:cNvSpPr>
+          <p:nvPr>
+            <p:ph idx="1"/>
+          </p:nvPr>
+        </p:nvSpPr>
+        <p:spPr/>
+        <p:txBody>
+          <a:bodyPr/>
+          <a:lstStyle/>
+          <a:p>
+            <a:r>
+              <a:rPr lang="en-US" b="0" i="0" dirty="0">
+                <a:effectLst/>
+                <a:latin typeface="Inter"/>
+              </a:rPr>
+              <a:t>Resting Electrocardiogram [</a:t>
+            </a:r>
+            <a:r>
+              <a:rPr lang="en-US" b="0" i="0" dirty="0" err="1">
+                <a:effectLst/>
+                <a:latin typeface="Inter"/>
+              </a:rPr>
+              <a:t>RestingECG</a:t>
+            </a:r>
+            <a:r>
+              <a:rPr lang="en-US" b="0" i="0" dirty="0">
+                <a:effectLst/>
+                <a:latin typeface="Inter"/>
+              </a:rPr>
+              <a:t>]</a:t>
+            </a:r>
+          </a:p>
+          <a:p>
+            <a:pPr lvl="1"/>
+            <a:r>
+              <a:rPr lang="en-US" b="0" i="0" dirty="0">
+                <a:effectLst/>
+                <a:latin typeface="Inter"/>
+              </a:rPr>
+              <a:t>The ca</a:t>
+            </a:r>
+            <a:r>
+              <a:rPr lang="en-US" dirty="0">
+                <a:latin typeface="Inter"/>
+              </a:rPr>
+              <a:t>tegories are results of an ECG.  Each is indicative of a different damage state of the heart.  i.e. Left </a:t>
+            </a:r>
+            <a:r>
+              <a:rPr lang="en-US" dirty="0" err="1">
+                <a:latin typeface="Inter"/>
+              </a:rPr>
+              <a:t>ventrical</a:t>
+            </a:r>
+            <a:r>
+              <a:rPr lang="en-US" dirty="0">
+                <a:latin typeface="Inter"/>
+              </a:rPr>
+              <a:t> hardening, myocardial </a:t>
+            </a:r>
+            <a:r>
+              <a:rPr lang="en-US" dirty="0" err="1">
+                <a:latin typeface="Inter"/>
+              </a:rPr>
+              <a:t>eschemia</a:t>
+            </a:r>
+            <a:r>
+              <a:rPr lang="en-US" dirty="0">
+                <a:latin typeface="Inter"/>
+              </a:rPr>
+              <a:t>, coronary artery occlusion.</a:t>
+            </a:r>
+          </a:p>
+          <a:p>
+            <a:pPr lvl="1"/>
+            <a:r>
+              <a:rPr lang="en-US" b="0" i="0" dirty="0">
+                <a:effectLst/>
+                <a:latin typeface="Inter"/>
+              </a:rPr>
+              <a:t>The ST keyword has di</a:t>
+            </a:r>
+            <a:r>
+              <a:rPr lang="en-US" dirty="0">
+                <a:latin typeface="Inter"/>
+              </a:rPr>
+              <a:t>fferent abnormalities lumped into this feature.  This will not be an issue for modelling since the models need not be fully interpretable for this academic exercise.</a:t>
+            </a:r>
+          </a:p>
+          <a:p>
+            <a:r>
+              <a:rPr lang="en-US" dirty="0"/>
+              <a:t>Exercise-Induced Angina [</a:t>
+            </a:r>
+            <a:r>
+              <a:rPr lang="en-US" dirty="0" err="1"/>
+              <a:t>ExerciseAngina</a:t>
+            </a:r>
+            <a:r>
+              <a:rPr lang="en-US" dirty="0"/>
+              <a:t>]</a:t>
+            </a:r>
+          </a:p>
+          <a:p>
+            <a:pPr lvl="1"/>
+            <a:r>
+              <a:rPr lang="en-US" dirty="0" err="1"/>
+              <a:t>Oldpeak</a:t>
+            </a:r>
+            <a:r>
+              <a:rPr lang="en-US" dirty="0"/>
+              <a:t> and </a:t>
+            </a:r>
+            <a:r>
+              <a:rPr lang="en-US" dirty="0" err="1"/>
+              <a:t>ST_Slope</a:t>
+            </a:r>
+            <a:r>
+              <a:rPr lang="en-US" dirty="0"/>
+              <a:t> features describe the ECG taken during exercise.  </a:t>
+            </a:r>
+          </a:p>
+          <a:p>
+            <a:endParaRPr lang="en-US" dirty="0">
+              <a:latin typeface="Inter"/>
+            </a:endParaRPr>
+          </a:p>
+        </p:txBody>
+      </p:sp>
+    </p:spTree>
+    <p:extLst>
+      <p:ext uri="{BB962C8B-B14F-4D97-AF65-F5344CB8AC3E}">
+        <p14:creationId xmlns:p14="http://schemas.microsoft.com/office/powerpoint/2010/main" val="1670110530"/>
+      </p:ext>
+    </p:extLst>
+  </p:cSld>
+  <p:clrMapOvr>
+    <a:masterClrMapping/>
+  </p:clrMapOvr>
+</p:sld>
+</file>
+
+<file path=ppt/slides/slide7.xml><?xml version="1.0" encoding="utf-8"?>
+<p:sld xmlns:a="http://schemas.openxmlformats.org/drawingml/2006/main" xmlns:r="http://schemas.openxmlformats.org/officeDocument/2006/relationships" xmlns:p="http://schemas.openxmlformats.org/presentationml/2006/main">
+  <p:cSld>
+    <p:spTree>
+      <p:nvGrpSpPr>
+        <p:cNvPr id="1" name=""/>
+        <p:cNvGrpSpPr/>
+        <p:nvPr/>
+      </p:nvGrpSpPr>
+      <p:grpSpPr>
+        <a:xfrm>
+          <a:off x="0" y="0"/>
+          <a:ext cx="0" cy="0"/>
+          <a:chOff x="0" y="0"/>
+          <a:chExt cx="0" cy="0"/>
+        </a:xfrm>
+      </p:grpSpPr>
+      <p:sp>
+        <p:nvSpPr>
+          <p:cNvPr id="2" name="Title 1">
+            <a:extLst>
+              <a:ext uri="{FF2B5EF4-FFF2-40B4-BE49-F238E27FC236}">
                 <a16:creationId xmlns:a16="http://schemas.microsoft.com/office/drawing/2014/main" id="{E24F6544-7808-7B0B-9303-84D9C73399BA}"/>
               </a:ext>
             </a:extLst>
@@ -4874,7 +6091,7 @@
         <p:spPr>
           <a:xfrm>
             <a:off x="838200" y="1690688"/>
-            <a:ext cx="4423913" cy="1754326"/>
+            <a:ext cx="4423913" cy="2031325"/>
           </a:xfrm>
           <a:prstGeom prst="rect">
             <a:avLst/>
@@ -4906,124 +6123,15 @@
               <a:t>We see from these plots that many observations do not have a cholesterol measurement.</a:t>
             </a:r>
           </a:p>
+          <a:p>
+            <a:endParaRPr lang="en-US" dirty="0"/>
+          </a:p>
         </p:txBody>
       </p:sp>
     </p:spTree>
     <p:extLst>
       <p:ext uri="{BB962C8B-B14F-4D97-AF65-F5344CB8AC3E}">
         <p14:creationId xmlns:p14="http://schemas.microsoft.com/office/powerpoint/2010/main" val="2360797636"/>
-      </p:ext>
-    </p:extLst>
-  </p:cSld>
-  <p:clrMapOvr>
-    <a:masterClrMapping/>
-  </p:clrMapOvr>
-</p:sld>
-</file>
-
-<file path=ppt/slides/slide7.xml><?xml version="1.0" encoding="utf-8"?>
-<p:sld xmlns:a="http://schemas.openxmlformats.org/drawingml/2006/main" xmlns:r="http://schemas.openxmlformats.org/officeDocument/2006/relationships" xmlns:p="http://schemas.openxmlformats.org/presentationml/2006/main">
-  <p:cSld>
-    <p:spTree>
-      <p:nvGrpSpPr>
-        <p:cNvPr id="1" name=""/>
-        <p:cNvGrpSpPr/>
-        <p:nvPr/>
-      </p:nvGrpSpPr>
-      <p:grpSpPr>
-        <a:xfrm>
-          <a:off x="0" y="0"/>
-          <a:ext cx="0" cy="0"/>
-          <a:chOff x="0" y="0"/>
-          <a:chExt cx="0" cy="0"/>
-        </a:xfrm>
-      </p:grpSpPr>
-      <p:sp>
-        <p:nvSpPr>
-          <p:cNvPr id="2" name="Title 1">
-            <a:extLst>
-              <a:ext uri="{FF2B5EF4-FFF2-40B4-BE49-F238E27FC236}">
-                <a16:creationId xmlns:a16="http://schemas.microsoft.com/office/drawing/2014/main" id="{EEAF0C6D-86B2-6630-C719-BEC9B54D1DF5}"/>
-              </a:ext>
-            </a:extLst>
-          </p:cNvPr>
-          <p:cNvSpPr>
-            <a:spLocks noGrp="1"/>
-          </p:cNvSpPr>
-          <p:nvPr>
-            <p:ph type="title"/>
-          </p:nvPr>
-        </p:nvSpPr>
-        <p:spPr/>
-        <p:txBody>
-          <a:bodyPr/>
-          <a:lstStyle/>
-          <a:p>
-            <a:r>
-              <a:rPr lang="en-US" dirty="0"/>
-              <a:t>Feature Engineering – Cholesterol Data</a:t>
-            </a:r>
-          </a:p>
-        </p:txBody>
-      </p:sp>
-      <p:sp>
-        <p:nvSpPr>
-          <p:cNvPr id="3" name="Content Placeholder 2">
-            <a:extLst>
-              <a:ext uri="{FF2B5EF4-FFF2-40B4-BE49-F238E27FC236}">
-                <a16:creationId xmlns:a16="http://schemas.microsoft.com/office/drawing/2014/main" id="{7D2E6FA3-6920-4EB9-9036-8A3F684D3FDB}"/>
-              </a:ext>
-            </a:extLst>
-          </p:cNvPr>
-          <p:cNvSpPr>
-            <a:spLocks noGrp="1"/>
-          </p:cNvSpPr>
-          <p:nvPr>
-            <p:ph idx="1"/>
-          </p:nvPr>
-        </p:nvSpPr>
-        <p:spPr/>
-        <p:txBody>
-          <a:bodyPr/>
-          <a:lstStyle/>
-          <a:p>
-            <a:r>
-              <a:rPr lang="en-US" dirty="0"/>
-              <a:t>Further exploration of the cholesterol feature shows that 172 observations have a 0 cholesterol measurement.</a:t>
-            </a:r>
-          </a:p>
-          <a:p>
-            <a:r>
-              <a:rPr lang="en-US" dirty="0"/>
-              <a:t>Of these 172 observations, 152 of them are for diseased </a:t>
-            </a:r>
-            <a:r>
-              <a:rPr lang="en-US" dirty="0" err="1"/>
-              <a:t>paitents</a:t>
-            </a:r>
-            <a:r>
-              <a:rPr lang="en-US" dirty="0"/>
-              <a:t>.</a:t>
-            </a:r>
-          </a:p>
-          <a:p>
-            <a:r>
-              <a:rPr lang="en-US" dirty="0"/>
-              <a:t>The doctor was likely able to make a diagnosis without ordering a cholesterol test.  </a:t>
-            </a:r>
-          </a:p>
-          <a:p>
-            <a:r>
-              <a:rPr lang="en-US" dirty="0"/>
-              <a:t>Going forward, this feature will remain as is.  The user of the models should be aware that a missing cholesterol measurement may be biased towards heart disease.</a:t>
-            </a:r>
-          </a:p>
-        </p:txBody>
-      </p:sp>
-    </p:spTree>
-    <p:extLst>
-      <p:ext uri="{BB962C8B-B14F-4D97-AF65-F5344CB8AC3E}">
-        <p14:creationId xmlns:p14="http://schemas.microsoft.com/office/powerpoint/2010/main" val="1616550174"/>
       </p:ext>
     </p:extLst>
   </p:cSld>
@@ -5055,7 +6163,7 @@
           <p:cNvPr id="2" name="Title 1">
             <a:extLst>
               <a:ext uri="{FF2B5EF4-FFF2-40B4-BE49-F238E27FC236}">
-                <a16:creationId xmlns:a16="http://schemas.microsoft.com/office/drawing/2014/main" id="{F4F3AF82-8EFE-C395-629C-39C789DA37A6}"/>
+                <a16:creationId xmlns:a16="http://schemas.microsoft.com/office/drawing/2014/main" id="{EEAF0C6D-86B2-6630-C719-BEC9B54D1DF5}"/>
               </a:ext>
             </a:extLst>
           </p:cNvPr>
@@ -5073,7 +6181,7 @@
           <a:p>
             <a:r>
               <a:rPr lang="en-US" dirty="0"/>
-              <a:t>Target Variable</a:t>
+              <a:t>Feature Engineering – Cholesterol Data</a:t>
             </a:r>
           </a:p>
         </p:txBody>
@@ -5083,7 +6191,7 @@
           <p:cNvPr id="3" name="Content Placeholder 2">
             <a:extLst>
               <a:ext uri="{FF2B5EF4-FFF2-40B4-BE49-F238E27FC236}">
-                <a16:creationId xmlns:a16="http://schemas.microsoft.com/office/drawing/2014/main" id="{3BEEFAA4-99A2-9810-5F01-EC6F653A109F}"/>
+                <a16:creationId xmlns:a16="http://schemas.microsoft.com/office/drawing/2014/main" id="{7D2E6FA3-6920-4EB9-9036-8A3F684D3FDB}"/>
               </a:ext>
             </a:extLst>
           </p:cNvPr>
@@ -5101,27 +6209,25 @@
           <a:p>
             <a:r>
               <a:rPr lang="en-US" dirty="0"/>
-              <a:t>The objective of these models are to assist Doctors in diagnosing heart disease based on the features present.  </a:t>
-            </a:r>
-          </a:p>
-          <a:p>
-            <a:r>
-              <a:rPr lang="en-US" dirty="0"/>
-              <a:t>The dataset contains 918 observations.  Of these observations, 508 have been previously diagnosed with heart disease [</a:t>
-            </a:r>
-            <a:r>
-              <a:rPr lang="en-US" dirty="0" err="1"/>
-              <a:t>HeartDisease</a:t>
-            </a:r>
-            <a:r>
-              <a:rPr lang="en-US" dirty="0"/>
-              <a:t> = 1].</a:t>
-            </a:r>
-          </a:p>
-          <a:p>
-            <a:r>
-              <a:rPr lang="en-US" dirty="0"/>
-              <a:t>This dataset is balanced.  </a:t>
+              <a:t>Further exploration of the cholesterol feature shows that 172 observations have a 0 cholesterol measurement.</a:t>
+            </a:r>
+          </a:p>
+          <a:p>
+            <a:r>
+              <a:rPr lang="en-US" dirty="0"/>
+              <a:t>Of these 172 observations, 152 of them are for diseased patients.</a:t>
+            </a:r>
+          </a:p>
+          <a:p>
+            <a:r>
+              <a:rPr lang="en-US" dirty="0"/>
+              <a:t>The doctor was likely able to make a diagnosis without ordering a cholesterol test.  </a:t>
+            </a:r>
+          </a:p>
+          <a:p>
+            <a:r>
+              <a:rPr lang="en-US" dirty="0"/>
+              <a:t>Going forward, this feature will remain as is.  The user of the models should be aware that a missing cholesterol measurement may be biased towards heart disease.</a:t>
             </a:r>
           </a:p>
         </p:txBody>
@@ -5129,7 +6235,7 @@
     </p:spTree>
     <p:extLst>
       <p:ext uri="{BB962C8B-B14F-4D97-AF65-F5344CB8AC3E}">
-        <p14:creationId xmlns:p14="http://schemas.microsoft.com/office/powerpoint/2010/main" val="145881549"/>
+        <p14:creationId xmlns:p14="http://schemas.microsoft.com/office/powerpoint/2010/main" val="1616550174"/>
       </p:ext>
     </p:extLst>
   </p:cSld>
@@ -5161,58 +6267,73 @@
           <p:cNvPr id="2" name="Title 1">
             <a:extLst>
               <a:ext uri="{FF2B5EF4-FFF2-40B4-BE49-F238E27FC236}">
-                <a16:creationId xmlns:a16="http://schemas.microsoft.com/office/drawing/2014/main" id="{80955CE2-94B4-5C73-241C-110298E67EAF}"/>
-              </a:ext>
-            </a:extLst>
-          </p:cNvPr>
-          <p:cNvSpPr>
-            <a:spLocks noGrp="1"/>
-          </p:cNvSpPr>
-          <p:nvPr>
-            <p:ph type="ctrTitle"/>
-          </p:nvPr>
-        </p:nvSpPr>
-        <p:spPr/>
-        <p:txBody>
-          <a:bodyPr/>
-          <a:lstStyle/>
-          <a:p>
-            <a:r>
-              <a:rPr lang="en-US" dirty="0"/>
-              <a:t>The Classifiers</a:t>
-            </a:r>
-          </a:p>
-        </p:txBody>
-      </p:sp>
-      <p:sp>
-        <p:nvSpPr>
-          <p:cNvPr id="3" name="Subtitle 2">
-            <a:extLst>
-              <a:ext uri="{FF2B5EF4-FFF2-40B4-BE49-F238E27FC236}">
-                <a16:creationId xmlns:a16="http://schemas.microsoft.com/office/drawing/2014/main" id="{A0C4E77C-BF71-6421-7EE3-37DDED0044B0}"/>
-              </a:ext>
-            </a:extLst>
-          </p:cNvPr>
-          <p:cNvSpPr>
-            <a:spLocks noGrp="1"/>
-          </p:cNvSpPr>
-          <p:nvPr>
-            <p:ph type="subTitle" idx="1"/>
-          </p:nvPr>
-        </p:nvSpPr>
-        <p:spPr/>
-        <p:txBody>
-          <a:bodyPr/>
-          <a:lstStyle/>
-          <a:p>
-            <a:endParaRPr lang="en-US"/>
+                <a16:creationId xmlns:a16="http://schemas.microsoft.com/office/drawing/2014/main" id="{B446C27A-1D1D-5DAC-E3B6-FE89A4E546C9}"/>
+              </a:ext>
+            </a:extLst>
+          </p:cNvPr>
+          <p:cNvSpPr>
+            <a:spLocks noGrp="1"/>
+          </p:cNvSpPr>
+          <p:nvPr>
+            <p:ph type="title"/>
+          </p:nvPr>
+        </p:nvSpPr>
+        <p:spPr/>
+        <p:txBody>
+          <a:bodyPr/>
+          <a:lstStyle/>
+          <a:p>
+            <a:r>
+              <a:rPr lang="en-US" dirty="0"/>
+              <a:t>Feature Engineering – Polynomial Features</a:t>
+            </a:r>
+          </a:p>
+        </p:txBody>
+      </p:sp>
+      <p:sp>
+        <p:nvSpPr>
+          <p:cNvPr id="3" name="Content Placeholder 2">
+            <a:extLst>
+              <a:ext uri="{FF2B5EF4-FFF2-40B4-BE49-F238E27FC236}">
+                <a16:creationId xmlns:a16="http://schemas.microsoft.com/office/drawing/2014/main" id="{5C35DC79-FB82-99AF-C4EC-F65CEBEA6671}"/>
+              </a:ext>
+            </a:extLst>
+          </p:cNvPr>
+          <p:cNvSpPr>
+            <a:spLocks noGrp="1"/>
+          </p:cNvSpPr>
+          <p:nvPr>
+            <p:ph idx="1"/>
+          </p:nvPr>
+        </p:nvSpPr>
+        <p:spPr/>
+        <p:txBody>
+          <a:bodyPr/>
+          <a:lstStyle/>
+          <a:p>
+            <a:r>
+              <a:rPr lang="en-US" dirty="0"/>
+              <a:t>Polynomial Features were selectively added to both the SVC and Logistic Regression models. </a:t>
+            </a:r>
+          </a:p>
+          <a:p>
+            <a:r>
+              <a:rPr lang="en-US" dirty="0"/>
+              <a:t>The logistic regression model was marginally improved by their introduction, while the SVC model suffered dramatically. </a:t>
+            </a:r>
+          </a:p>
+          <a:p>
+            <a:r>
+              <a:rPr lang="en-US" dirty="0"/>
+              <a:t>Details are not shown in this presentation, but the curious member of the audience can find their results in the attached notebook.</a:t>
+            </a:r>
           </a:p>
         </p:txBody>
       </p:sp>
     </p:spTree>
     <p:extLst>
       <p:ext uri="{BB962C8B-B14F-4D97-AF65-F5344CB8AC3E}">
-        <p14:creationId xmlns:p14="http://schemas.microsoft.com/office/powerpoint/2010/main" val="3680377310"/>
+        <p14:creationId xmlns:p14="http://schemas.microsoft.com/office/powerpoint/2010/main" val="2363108327"/>
       </p:ext>
     </p:extLst>
   </p:cSld>

</xml_diff>